<commit_message>
Objective function implemented + random solution implemented
</commit_message>
<xml_diff>
--- a/assets/Checkpoint1.pptx
+++ b/assets/Checkpoint1.pptx
@@ -278,7 +278,7 @@
             <a:pPr rtl="0"/>
             <a:fld id="{A975D426-A9DD-4244-A2CE-1FB6623742C7}" type="slidenum">
               <a:rPr lang="en-US" smtClean="0"/>
-              <a:t>‹nº›</a:t>
+              <a:t>‹#›</a:t>
             </a:fld>
             <a:endParaRPr lang="en-US"/>
           </a:p>
@@ -543,7 +543,7 @@
             <a:pPr rtl="0"/>
             <a:fld id="{01B41D33-19C8-4450-B3C5-BE83E9C8F0BC}" type="slidenum">
               <a:rPr lang="en-US" smtClean="0"/>
-              <a:t>‹nº›</a:t>
+              <a:t>‹#›</a:t>
             </a:fld>
             <a:endParaRPr lang="en-US"/>
           </a:p>
@@ -950,7 +950,7 @@
             <a:pPr rtl="0"/>
             <a:fld id="{3A98EE3D-8CD1-4C3F-BD1C-C98C9596463C}" type="slidenum">
               <a:rPr lang="en-US" smtClean="0"/>
-              <a:t>‹nº›</a:t>
+              <a:t>‹#›</a:t>
             </a:fld>
             <a:endParaRPr lang="en-US" dirty="0"/>
           </a:p>
@@ -1145,7 +1145,7 @@
             <a:pPr rtl="0"/>
             <a:fld id="{3A98EE3D-8CD1-4C3F-BD1C-C98C9596463C}" type="slidenum">
               <a:rPr lang="en-US" smtClean="0"/>
-              <a:t>‹nº›</a:t>
+              <a:t>‹#›</a:t>
             </a:fld>
             <a:endParaRPr lang="en-US" dirty="0"/>
           </a:p>
@@ -1523,7 +1523,7 @@
             <a:pPr rtl="0"/>
             <a:fld id="{3A98EE3D-8CD1-4C3F-BD1C-C98C9596463C}" type="slidenum">
               <a:rPr lang="en-US" smtClean="0"/>
-              <a:t>‹nº›</a:t>
+              <a:t>‹#›</a:t>
             </a:fld>
             <a:endParaRPr lang="en-US" dirty="0"/>
           </a:p>
@@ -1725,7 +1725,7 @@
             <a:pPr rtl="0"/>
             <a:fld id="{3A98EE3D-8CD1-4C3F-BD1C-C98C9596463C}" type="slidenum">
               <a:rPr lang="en-US" smtClean="0"/>
-              <a:t>‹nº›</a:t>
+              <a:t>‹#›</a:t>
             </a:fld>
             <a:endParaRPr lang="en-US" dirty="0"/>
           </a:p>
@@ -2041,7 +2041,7 @@
             <a:pPr rtl="0"/>
             <a:fld id="{3A98EE3D-8CD1-4C3F-BD1C-C98C9596463C}" type="slidenum">
               <a:rPr lang="en-US" smtClean="0"/>
-              <a:t>‹nº›</a:t>
+              <a:t>‹#›</a:t>
             </a:fld>
             <a:endParaRPr lang="en-US" dirty="0"/>
           </a:p>
@@ -2286,7 +2286,7 @@
             <a:pPr rtl="0"/>
             <a:fld id="{3A98EE3D-8CD1-4C3F-BD1C-C98C9596463C}" type="slidenum">
               <a:rPr lang="en-US" smtClean="0"/>
-              <a:t>‹nº›</a:t>
+              <a:t>‹#›</a:t>
             </a:fld>
             <a:endParaRPr lang="en-US" dirty="0"/>
           </a:p>
@@ -2720,7 +2720,7 @@
             <a:pPr rtl="0"/>
             <a:fld id="{3A98EE3D-8CD1-4C3F-BD1C-C98C9596463C}" type="slidenum">
               <a:rPr lang="en-US" smtClean="0"/>
-              <a:t>‹nº›</a:t>
+              <a:t>‹#›</a:t>
             </a:fld>
             <a:endParaRPr lang="en-US" dirty="0"/>
           </a:p>
@@ -2847,7 +2847,7 @@
             <a:pPr rtl="0"/>
             <a:fld id="{3A98EE3D-8CD1-4C3F-BD1C-C98C9596463C}" type="slidenum">
               <a:rPr lang="en-US" smtClean="0"/>
-              <a:t>‹nº›</a:t>
+              <a:t>‹#›</a:t>
             </a:fld>
             <a:endParaRPr lang="en-US" dirty="0"/>
           </a:p>
@@ -2945,7 +2945,7 @@
             <a:pPr rtl="0"/>
             <a:fld id="{3A98EE3D-8CD1-4C3F-BD1C-C98C9596463C}" type="slidenum">
               <a:rPr lang="en-US" smtClean="0"/>
-              <a:t>‹nº›</a:t>
+              <a:t>‹#›</a:t>
             </a:fld>
             <a:endParaRPr lang="en-US" dirty="0"/>
           </a:p>
@@ -3349,7 +3349,7 @@
             <a:fld id="{3A98EE3D-8CD1-4C3F-BD1C-C98C9596463C}" type="slidenum">
               <a:rPr lang="en-US" smtClean="0"/>
               <a:pPr rtl="0"/>
-              <a:t>‹nº›</a:t>
+              <a:t>‹#›</a:t>
             </a:fld>
             <a:endParaRPr lang="en-US" dirty="0"/>
           </a:p>
@@ -3624,7 +3624,7 @@
             <a:pPr rtl="0"/>
             <a:fld id="{3A98EE3D-8CD1-4C3F-BD1C-C98C9596463C}" type="slidenum">
               <a:rPr lang="en-US" smtClean="0"/>
-              <a:t>‹nº›</a:t>
+              <a:t>‹#›</a:t>
             </a:fld>
             <a:endParaRPr lang="en-US" dirty="0"/>
           </a:p>
@@ -3880,7 +3880,7 @@
             <a:pPr rtl="0"/>
             <a:fld id="{3A98EE3D-8CD1-4C3F-BD1C-C98C9596463C}" type="slidenum">
               <a:rPr lang="en-US" smtClean="0"/>
-              <a:t>‹nº›</a:t>
+              <a:t>‹#›</a:t>
             </a:fld>
             <a:endParaRPr lang="en-US" dirty="0"/>
           </a:p>
@@ -4502,31 +4502,31 @@
           <a:lstStyle/>
           <a:p>
             <a:r>
-              <a:rPr lang="pt-PT" dirty="0" err="1" smtClean="0"/>
+              <a:rPr lang="pt-PT" dirty="0" err="1"/>
               <a:t>Hash</a:t>
             </a:r>
             <a:r>
-              <a:rPr lang="pt-PT" dirty="0" smtClean="0"/>
+              <a:rPr lang="pt-PT" dirty="0"/>
               <a:t> </a:t>
             </a:r>
             <a:r>
-              <a:rPr lang="pt-PT" dirty="0" err="1" smtClean="0"/>
+              <a:rPr lang="pt-PT" dirty="0" err="1"/>
               <a:t>code</a:t>
             </a:r>
             <a:r>
-              <a:rPr lang="pt-PT" dirty="0" smtClean="0"/>
+              <a:rPr lang="pt-PT" dirty="0"/>
               <a:t> 2019: </a:t>
             </a:r>
             <a:r>
-              <a:rPr lang="pt-PT" dirty="0" err="1" smtClean="0"/>
+              <a:rPr lang="pt-PT" dirty="0" err="1"/>
               <a:t>Photo</a:t>
             </a:r>
             <a:r>
-              <a:rPr lang="pt-PT" dirty="0" smtClean="0"/>
+              <a:rPr lang="pt-PT" dirty="0"/>
               <a:t> </a:t>
             </a:r>
             <a:r>
-              <a:rPr lang="pt-PT" dirty="0" err="1" smtClean="0"/>
+              <a:rPr lang="pt-PT" dirty="0" err="1"/>
               <a:t>slideshow</a:t>
             </a:r>
             <a:endParaRPr lang="pt-PT" dirty="0"/>
@@ -4606,7 +4606,7 @@
           <a:p>
             <a:pPr algn="r"/>
             <a:r>
-              <a:rPr lang="pt-PT" dirty="0" smtClean="0">
+              <a:rPr lang="pt-PT" dirty="0">
                 <a:solidFill>
                   <a:schemeClr val="bg1"/>
                 </a:solidFill>
@@ -4617,7 +4617,7 @@
           <a:p>
             <a:pPr algn="r"/>
             <a:r>
-              <a:rPr lang="pt-PT" dirty="0" smtClean="0">
+              <a:rPr lang="pt-PT" dirty="0">
                 <a:solidFill>
                   <a:schemeClr val="bg1"/>
                 </a:solidFill>
@@ -4628,20 +4628,12 @@
           <a:p>
             <a:pPr algn="r"/>
             <a:r>
-              <a:rPr lang="pt-PT" dirty="0" smtClean="0">
-                <a:solidFill>
-                  <a:schemeClr val="bg1"/>
-                </a:solidFill>
-              </a:rPr>
-              <a:t>Raúl Viana </a:t>
-            </a:r>
-            <a:r>
               <a:rPr lang="pt-PT" dirty="0">
                 <a:solidFill>
                   <a:schemeClr val="bg1"/>
                 </a:solidFill>
               </a:rPr>
-              <a:t>-  up201208089@fe.up.pt</a:t>
+              <a:t>Raúl Viana -  up201208089@fe.up.pt</a:t>
             </a:r>
           </a:p>
         </p:txBody>
@@ -4733,7 +4725,7 @@
                 <a16:creationId xmlns:a16="http://schemas.microsoft.com/office/drawing/2014/main" id="{D6D7A0BC-0046-4CAA-8E7F-DCAFE511EA0E}"/>
               </a:ext>
               <a:ext uri="{C183D7F6-B498-43B3-948B-1728B52AA6E4}">
-                <adec:decorative xmlns="" xmlns:adec="http://schemas.microsoft.com/office/drawing/2017/decorative" val="1"/>
+                <adec:decorative xmlns:adec="http://schemas.microsoft.com/office/drawing/2017/decorative" val="1"/>
               </a:ext>
             </a:extLst>
           </p:cNvPr>
@@ -4868,7 +4860,7 @@
           <a:p>
             <a:pPr rtl="0"/>
             <a:r>
-              <a:rPr lang="pt-PT" sz="2000" b="1" cap="none" dirty="0" smtClean="0">
+              <a:rPr lang="pt-PT" sz="2000" b="1" cap="none" dirty="0">
                 <a:ln w="0"/>
                 <a:effectLst>
                   <a:outerShdw blurRad="38100" dist="25400" dir="5400000" algn="ctr" rotWithShape="0">
@@ -4892,7 +4884,7 @@
                 <a16:creationId xmlns:a16="http://schemas.microsoft.com/office/drawing/2014/main" id="{E7C6334F-6411-41EC-AD7D-179EDD8B58CB}"/>
               </a:ext>
               <a:ext uri="{C183D7F6-B498-43B3-948B-1728B52AA6E4}">
-                <adec:decorative xmlns="" xmlns:adec="http://schemas.microsoft.com/office/drawing/2017/decorative" val="1"/>
+                <adec:decorative xmlns:adec="http://schemas.microsoft.com/office/drawing/2017/decorative" val="1"/>
               </a:ext>
             </a:extLst>
           </p:cNvPr>
@@ -4946,7 +4938,7 @@
                 <a16:creationId xmlns:a16="http://schemas.microsoft.com/office/drawing/2014/main" id="{E6B02CEE-3AF8-4349-9B3E-8970E6DF62B3}"/>
               </a:ext>
               <a:ext uri="{C183D7F6-B498-43B3-948B-1728B52AA6E4}">
-                <adec:decorative xmlns="" xmlns:adec="http://schemas.microsoft.com/office/drawing/2017/decorative" val="1"/>
+                <adec:decorative xmlns:adec="http://schemas.microsoft.com/office/drawing/2017/decorative" val="1"/>
               </a:ext>
             </a:extLst>
           </p:cNvPr>
@@ -5000,7 +4992,7 @@
                 <a16:creationId xmlns:a16="http://schemas.microsoft.com/office/drawing/2014/main" id="{AAA01CF0-3FB5-44EB-B7DE-F2E86374C2FB}"/>
               </a:ext>
               <a:ext uri="{C183D7F6-B498-43B3-948B-1728B52AA6E4}">
-                <adec:decorative xmlns="" xmlns:adec="http://schemas.microsoft.com/office/drawing/2017/decorative" val="1"/>
+                <adec:decorative xmlns:adec="http://schemas.microsoft.com/office/drawing/2017/decorative" val="1"/>
               </a:ext>
             </a:extLst>
           </p:cNvPr>
@@ -5080,99 +5072,79 @@
               </a:lnSpc>
             </a:pPr>
             <a:r>
-              <a:rPr lang="pt-PT" sz="1600" b="1" dirty="0" smtClean="0"/>
+              <a:rPr lang="pt-PT" sz="1600" b="1" dirty="0"/>
               <a:t>Objetivo</a:t>
             </a:r>
             <a:r>
-              <a:rPr lang="en-US" sz="1600" dirty="0" smtClean="0"/>
-              <a:t>: </a:t>
-            </a:r>
-            <a:r>
-              <a:rPr lang="en-US" sz="1600" dirty="0"/>
-              <a:t>Dada </a:t>
-            </a:r>
-            <a:r>
-              <a:rPr lang="pt-PT" sz="1600" dirty="0" smtClean="0"/>
+              <a:rPr lang="en-US" sz="1600" dirty="0"/>
+              <a:t>: Dada </a:t>
+            </a:r>
+            <a:r>
+              <a:rPr lang="pt-PT" sz="1600" dirty="0"/>
               <a:t>uma</a:t>
             </a:r>
             <a:r>
-              <a:rPr lang="en-US" sz="1600" dirty="0" smtClean="0"/>
+              <a:rPr lang="en-US" sz="1600" dirty="0"/>
               <a:t> </a:t>
             </a:r>
             <a:r>
-              <a:rPr lang="pt-PT" sz="1600" dirty="0" smtClean="0"/>
+              <a:rPr lang="pt-PT" sz="1600" dirty="0"/>
               <a:t>lista</a:t>
             </a:r>
             <a:r>
-              <a:rPr lang="en-US" sz="1600" dirty="0" smtClean="0"/>
-              <a:t> de </a:t>
-            </a:r>
-            <a:r>
-              <a:rPr lang="en-US" sz="1600" dirty="0"/>
-              <a:t>fotografias </a:t>
-            </a:r>
-            <a:r>
-              <a:rPr lang="en-US" sz="1600" dirty="0" smtClean="0"/>
-              <a:t>e </a:t>
-            </a:r>
-            <a:r>
-              <a:rPr lang="en-US" sz="1600" i="1" dirty="0" smtClean="0"/>
+              <a:rPr lang="en-US" sz="1600" dirty="0"/>
+              <a:t> de fotografias e </a:t>
+            </a:r>
+            <a:r>
+              <a:rPr lang="en-US" sz="1600" i="1" dirty="0"/>
               <a:t>tags</a:t>
             </a:r>
             <a:r>
-              <a:rPr lang="en-US" sz="1600" dirty="0" smtClean="0"/>
+              <a:rPr lang="en-US" sz="1600" dirty="0"/>
+              <a:t> associadas a cada uma delas, ordená-las num </a:t>
+            </a:r>
+            <a:r>
+              <a:rPr lang="en-US" sz="1600" i="1" dirty="0"/>
+              <a:t>slideshow</a:t>
+            </a:r>
+            <a:r>
+              <a:rPr lang="en-US" sz="1600" dirty="0"/>
+              <a:t> de forma a que este seja o mais </a:t>
+            </a:r>
+            <a:r>
+              <a:rPr lang="en-US" sz="1600" dirty="0" err="1"/>
+              <a:t>interessante</a:t>
+            </a:r>
+            <a:r>
+              <a:rPr lang="en-US" sz="1600" dirty="0"/>
               <a:t> </a:t>
             </a:r>
             <a:r>
-              <a:rPr lang="en-US" sz="1600" dirty="0"/>
-              <a:t>associadas a cada uma delas, ordená-las num </a:t>
-            </a:r>
-            <a:r>
-              <a:rPr lang="en-US" sz="1600" i="1" dirty="0" smtClean="0"/>
-              <a:t>slideshow</a:t>
-            </a:r>
-            <a:r>
-              <a:rPr lang="en-US" sz="1600" dirty="0" smtClean="0"/>
+              <a:rPr lang="pt-PT" sz="1600" dirty="0"/>
+              <a:t>possível (</a:t>
+            </a:r>
+            <a:r>
+              <a:rPr lang="en-US" sz="1600" dirty="0" err="1"/>
+              <a:t>obtendo</a:t>
+            </a:r>
+            <a:r>
+              <a:rPr lang="en-US" sz="1600" dirty="0"/>
               <a:t> </a:t>
             </a:r>
             <a:r>
-              <a:rPr lang="en-US" sz="1600" dirty="0"/>
-              <a:t>de forma a que este seja o mais </a:t>
-            </a:r>
-            <a:r>
-              <a:rPr lang="en-US" sz="1600" dirty="0" err="1"/>
-              <a:t>interessante</a:t>
+              <a:rPr lang="en-US" sz="1600" dirty="0" err="1"/>
+              <a:t>maior</a:t>
             </a:r>
             <a:r>
               <a:rPr lang="en-US" sz="1600" dirty="0"/>
               <a:t> </a:t>
             </a:r>
             <a:r>
-              <a:rPr lang="pt-PT" sz="1600" dirty="0" smtClean="0"/>
-              <a:t>possível (</a:t>
-            </a:r>
-            <a:r>
-              <a:rPr lang="en-US" sz="1600" dirty="0" err="1" smtClean="0"/>
-              <a:t>obtendo</a:t>
-            </a:r>
-            <a:r>
-              <a:rPr lang="en-US" sz="1600" dirty="0"/>
-              <a:t> </a:t>
-            </a:r>
-            <a:r>
-              <a:rPr lang="en-US" sz="1600" dirty="0" err="1" smtClean="0"/>
-              <a:t>maior</a:t>
-            </a:r>
-            <a:r>
-              <a:rPr lang="en-US" sz="1600" dirty="0" smtClean="0"/>
-              <a:t> </a:t>
-            </a:r>
-            <a:r>
-              <a:rPr lang="en-US" sz="1600" dirty="0" err="1" smtClean="0"/>
+              <a:rPr lang="en-US" sz="1600" dirty="0" err="1"/>
               <a:t>pontuação</a:t>
             </a:r>
             <a:r>
-              <a:rPr lang="en-US" sz="1600" dirty="0" smtClean="0"/>
+              <a:rPr lang="en-US" sz="1600" dirty="0"/>
               <a:t>).</a:t>
             </a:r>
           </a:p>
@@ -5248,215 +5220,211 @@
               </a:lnSpc>
             </a:pPr>
             <a:r>
-              <a:rPr lang="en-US" sz="1600" b="1" dirty="0" err="1" smtClean="0"/>
+              <a:rPr lang="en-US" sz="1600" b="1" dirty="0" err="1"/>
               <a:t>Pontuação</a:t>
             </a:r>
             <a:r>
-              <a:rPr lang="en-US" sz="1600" dirty="0" smtClean="0"/>
+              <a:rPr lang="en-US" sz="1600" dirty="0"/>
               <a:t>: A </a:t>
             </a:r>
             <a:r>
-              <a:rPr lang="en-US" sz="1600" dirty="0" err="1" smtClean="0"/>
+              <a:rPr lang="en-US" sz="1600" dirty="0" err="1"/>
               <a:t>pontuação</a:t>
             </a:r>
             <a:r>
-              <a:rPr lang="en-US" sz="1600" dirty="0" smtClean="0"/>
+              <a:rPr lang="en-US" sz="1600" dirty="0"/>
               <a:t> </a:t>
             </a:r>
             <a:r>
-              <a:rPr lang="en-US" sz="1600" dirty="0" err="1" smtClean="0"/>
+              <a:rPr lang="en-US" sz="1600" dirty="0" err="1"/>
               <a:t>depende</a:t>
             </a:r>
             <a:r>
-              <a:rPr lang="en-US" sz="1600" dirty="0" smtClean="0"/>
+              <a:rPr lang="en-US" sz="1600" dirty="0"/>
               <a:t> do </a:t>
             </a:r>
             <a:r>
-              <a:rPr lang="en-US" sz="1600" dirty="0" err="1" smtClean="0"/>
+              <a:rPr lang="en-US" sz="1600" dirty="0" err="1"/>
               <a:t>interesse</a:t>
             </a:r>
             <a:r>
               <a:rPr lang="en-US" sz="1600" dirty="0"/>
+              <a:t> das </a:t>
+            </a:r>
+            <a:r>
+              <a:rPr lang="en-US" sz="1600" dirty="0" err="1"/>
+              <a:t>transições</a:t>
+            </a:r>
+            <a:r>
+              <a:rPr lang="en-US" sz="1600" dirty="0"/>
+              <a:t> entre </a:t>
+            </a:r>
+            <a:r>
+              <a:rPr lang="en-US" sz="1600" i="1" dirty="0"/>
+              <a:t>slides </a:t>
+            </a:r>
+            <a:r>
+              <a:rPr lang="en-US" sz="1600" dirty="0" err="1"/>
+              <a:t>vizinhos</a:t>
+            </a:r>
+            <a:r>
+              <a:rPr lang="en-US" sz="1600" dirty="0"/>
+              <a:t>. As </a:t>
+            </a:r>
+            <a:r>
+              <a:rPr lang="en-US" sz="1600" dirty="0" err="1"/>
+              <a:t>transições</a:t>
+            </a:r>
+            <a:r>
+              <a:rPr lang="en-US" sz="1600" dirty="0"/>
               <a:t> </a:t>
             </a:r>
             <a:r>
-              <a:rPr lang="en-US" sz="1600" dirty="0" smtClean="0"/>
-              <a:t>das </a:t>
-            </a:r>
-            <a:r>
-              <a:rPr lang="en-US" sz="1600" dirty="0" err="1" smtClean="0"/>
-              <a:t>transições</a:t>
-            </a:r>
-            <a:r>
-              <a:rPr lang="en-US" sz="1600" dirty="0" smtClean="0"/>
-              <a:t> entre </a:t>
-            </a:r>
-            <a:r>
-              <a:rPr lang="en-US" sz="1600" i="1" dirty="0" smtClean="0"/>
-              <a:t>slides </a:t>
-            </a:r>
-            <a:r>
-              <a:rPr lang="en-US" sz="1600" dirty="0" err="1" smtClean="0"/>
-              <a:t>vizinhos</a:t>
-            </a:r>
-            <a:r>
-              <a:rPr lang="en-US" sz="1600" dirty="0" smtClean="0"/>
-              <a:t>. As </a:t>
-            </a:r>
-            <a:r>
-              <a:rPr lang="en-US" sz="1600" dirty="0" err="1" smtClean="0"/>
-              <a:t>transições</a:t>
-            </a:r>
-            <a:r>
-              <a:rPr lang="en-US" sz="1600" dirty="0" smtClean="0"/>
+              <a:rPr lang="en-US" sz="1600" dirty="0" err="1"/>
+              <a:t>devem</a:t>
+            </a:r>
+            <a:r>
+              <a:rPr lang="en-US" sz="1600" dirty="0"/>
               <a:t> </a:t>
             </a:r>
             <a:r>
-              <a:rPr lang="en-US" sz="1600" dirty="0" err="1" smtClean="0"/>
-              <a:t>devem</a:t>
-            </a:r>
-            <a:r>
-              <a:rPr lang="en-US" sz="1600" dirty="0" smtClean="0"/>
+              <a:rPr lang="en-US" sz="1600" dirty="0" err="1"/>
+              <a:t>preservar</a:t>
+            </a:r>
+            <a:r>
+              <a:rPr lang="en-US" sz="1600" dirty="0"/>
               <a:t> </a:t>
             </a:r>
             <a:r>
-              <a:rPr lang="en-US" sz="1600" dirty="0" err="1" smtClean="0"/>
-              <a:t>preservar</a:t>
-            </a:r>
-            <a:r>
-              <a:rPr lang="en-US" sz="1600" dirty="0" smtClean="0"/>
+              <a:rPr lang="en-US" sz="1600" dirty="0" err="1"/>
+              <a:t>continuidade</a:t>
+            </a:r>
+            <a:r>
+              <a:rPr lang="en-US" sz="1600" dirty="0"/>
               <a:t> </a:t>
             </a:r>
             <a:r>
-              <a:rPr lang="en-US" sz="1600" dirty="0" err="1" smtClean="0"/>
-              <a:t>continuidade</a:t>
-            </a:r>
-            <a:r>
-              <a:rPr lang="en-US" sz="1600" dirty="0" smtClean="0"/>
+              <a:rPr lang="en-US" sz="1600" dirty="0" err="1"/>
+              <a:t>mantendo</a:t>
+            </a:r>
+            <a:r>
+              <a:rPr lang="en-US" sz="1600" dirty="0"/>
+              <a:t> a </a:t>
+            </a:r>
+            <a:r>
+              <a:rPr lang="en-US" sz="1600" dirty="0" err="1"/>
+              <a:t>audiência</a:t>
+            </a:r>
+            <a:r>
+              <a:rPr lang="en-US" sz="1600" dirty="0"/>
               <a:t> </a:t>
             </a:r>
             <a:r>
-              <a:rPr lang="en-US" sz="1600" dirty="0" err="1" smtClean="0"/>
-              <a:t>mantendo</a:t>
-            </a:r>
-            <a:r>
-              <a:rPr lang="en-US" sz="1600" dirty="0" smtClean="0"/>
+              <a:rPr lang="en-US" sz="1600" dirty="0" err="1"/>
+              <a:t>interessada</a:t>
+            </a:r>
+            <a:r>
+              <a:rPr lang="en-US" sz="1600" dirty="0"/>
+              <a:t>. </a:t>
+            </a:r>
+            <a:r>
+              <a:rPr lang="en-US" sz="1600" dirty="0" err="1"/>
+              <a:t>Duas</a:t>
+            </a:r>
+            <a:r>
+              <a:rPr lang="en-US" sz="1600" dirty="0"/>
+              <a:t> </a:t>
+            </a:r>
+            <a:r>
+              <a:rPr lang="en-US" sz="1600" dirty="0" err="1"/>
+              <a:t>imagens</a:t>
+            </a:r>
+            <a:r>
+              <a:rPr lang="en-US" sz="1600" dirty="0"/>
+              <a:t> </a:t>
+            </a:r>
+            <a:r>
+              <a:rPr lang="en-US" sz="1600" dirty="0" err="1"/>
+              <a:t>verticais</a:t>
+            </a:r>
+            <a:r>
+              <a:rPr lang="en-US" sz="1600" dirty="0"/>
+              <a:t> </a:t>
+            </a:r>
+            <a:r>
+              <a:rPr lang="en-US" sz="1600" dirty="0" err="1"/>
+              <a:t>podem</a:t>
+            </a:r>
+            <a:r>
+              <a:rPr lang="en-US" sz="1600" dirty="0"/>
+              <a:t> </a:t>
+            </a:r>
+            <a:r>
+              <a:rPr lang="en-US" sz="1600" dirty="0" err="1"/>
+              <a:t>ter</a:t>
+            </a:r>
+            <a:r>
+              <a:rPr lang="en-US" sz="1600" dirty="0"/>
+              <a:t> </a:t>
+            </a:r>
+            <a:r>
+              <a:rPr lang="en-US" sz="1600" i="1" dirty="0"/>
+              <a:t>tags </a:t>
+            </a:r>
+            <a:r>
+              <a:rPr lang="en-US" sz="1600" dirty="0" err="1"/>
+              <a:t>em</a:t>
+            </a:r>
+            <a:r>
+              <a:rPr lang="en-US" sz="1600" dirty="0"/>
+              <a:t> </a:t>
+            </a:r>
+            <a:r>
+              <a:rPr lang="en-US" sz="1600" dirty="0" err="1"/>
+              <a:t>comum</a:t>
+            </a:r>
+            <a:r>
+              <a:rPr lang="en-US" sz="1600" dirty="0"/>
+              <a:t> mas </a:t>
+            </a:r>
+            <a:r>
+              <a:rPr lang="en-US" sz="1600" dirty="0" err="1"/>
+              <a:t>essa</a:t>
+            </a:r>
+            <a:r>
+              <a:rPr lang="en-US" sz="1600" dirty="0"/>
+              <a:t> </a:t>
+            </a:r>
+            <a:r>
+              <a:rPr lang="en-US" sz="1600" dirty="0" err="1"/>
+              <a:t>semelhança</a:t>
+            </a:r>
+            <a:r>
+              <a:rPr lang="en-US" sz="1600" dirty="0"/>
+              <a:t> </a:t>
+            </a:r>
+            <a:r>
+              <a:rPr lang="en-US" sz="1600" dirty="0" err="1"/>
+              <a:t>não</a:t>
+            </a:r>
+            <a:r>
+              <a:rPr lang="en-US" sz="1600" dirty="0"/>
+              <a:t> </a:t>
+            </a:r>
+            <a:r>
+              <a:rPr lang="en-US" sz="1600" dirty="0" err="1"/>
+              <a:t>influencia</a:t>
+            </a:r>
+            <a:r>
+              <a:rPr lang="en-US" sz="1600" dirty="0"/>
               <a:t> a </a:t>
             </a:r>
             <a:r>
-              <a:rPr lang="en-US" sz="1600" dirty="0" err="1" smtClean="0"/>
-              <a:t>audiência</a:t>
-            </a:r>
-            <a:r>
-              <a:rPr lang="en-US" sz="1600" dirty="0" smtClean="0"/>
-              <a:t> </a:t>
-            </a:r>
-            <a:r>
-              <a:rPr lang="en-US" sz="1600" dirty="0" err="1" smtClean="0"/>
-              <a:t>interessada</a:t>
-            </a:r>
-            <a:r>
-              <a:rPr lang="en-US" sz="1600" dirty="0" smtClean="0"/>
-              <a:t>. </a:t>
-            </a:r>
-            <a:r>
-              <a:rPr lang="en-US" sz="1600" dirty="0" err="1" smtClean="0"/>
-              <a:t>Duas</a:t>
-            </a:r>
-            <a:r>
-              <a:rPr lang="en-US" sz="1600" dirty="0" smtClean="0"/>
-              <a:t> </a:t>
-            </a:r>
-            <a:r>
-              <a:rPr lang="en-US" sz="1600" dirty="0" err="1" smtClean="0"/>
-              <a:t>imagens</a:t>
-            </a:r>
-            <a:r>
-              <a:rPr lang="en-US" sz="1600" dirty="0" smtClean="0"/>
-              <a:t> </a:t>
-            </a:r>
-            <a:r>
-              <a:rPr lang="en-US" sz="1600" dirty="0" err="1" smtClean="0"/>
-              <a:t>verticais</a:t>
-            </a:r>
-            <a:r>
-              <a:rPr lang="en-US" sz="1600" dirty="0" smtClean="0"/>
-              <a:t> </a:t>
-            </a:r>
-            <a:r>
-              <a:rPr lang="en-US" sz="1600" dirty="0" err="1" smtClean="0"/>
-              <a:t>podem</a:t>
-            </a:r>
-            <a:r>
-              <a:rPr lang="en-US" sz="1600" dirty="0" smtClean="0"/>
-              <a:t> </a:t>
-            </a:r>
-            <a:r>
-              <a:rPr lang="en-US" sz="1600" dirty="0" err="1" smtClean="0"/>
-              <a:t>ter</a:t>
-            </a:r>
-            <a:r>
-              <a:rPr lang="en-US" sz="1600" dirty="0" smtClean="0"/>
-              <a:t> </a:t>
-            </a:r>
-            <a:r>
-              <a:rPr lang="en-US" sz="1600" i="1" dirty="0" smtClean="0"/>
-              <a:t>tags </a:t>
-            </a:r>
-            <a:r>
-              <a:rPr lang="en-US" sz="1600" dirty="0" err="1" smtClean="0"/>
-              <a:t>em</a:t>
-            </a:r>
-            <a:r>
-              <a:rPr lang="en-US" sz="1600" dirty="0" smtClean="0"/>
-              <a:t> </a:t>
-            </a:r>
-            <a:r>
-              <a:rPr lang="en-US" sz="1600" dirty="0" err="1" smtClean="0"/>
-              <a:t>comum</a:t>
-            </a:r>
-            <a:r>
-              <a:rPr lang="en-US" sz="1600" dirty="0" smtClean="0"/>
-              <a:t> mas </a:t>
-            </a:r>
-            <a:r>
-              <a:rPr lang="en-US" sz="1600" dirty="0" err="1" smtClean="0"/>
-              <a:t>essa</a:t>
-            </a:r>
-            <a:r>
-              <a:rPr lang="en-US" sz="1600" dirty="0" smtClean="0"/>
-              <a:t> </a:t>
-            </a:r>
-            <a:r>
-              <a:rPr lang="en-US" sz="1600" dirty="0" err="1" smtClean="0"/>
-              <a:t>semelhança</a:t>
-            </a:r>
-            <a:r>
-              <a:rPr lang="en-US" sz="1600" dirty="0" smtClean="0"/>
-              <a:t> </a:t>
-            </a:r>
-            <a:r>
-              <a:rPr lang="en-US" sz="1600" dirty="0" err="1" smtClean="0"/>
-              <a:t>não</a:t>
-            </a:r>
-            <a:r>
-              <a:rPr lang="en-US" sz="1600" dirty="0" smtClean="0"/>
-              <a:t> </a:t>
-            </a:r>
-            <a:r>
-              <a:rPr lang="en-US" sz="1600" dirty="0" err="1" smtClean="0"/>
-              <a:t>influencia</a:t>
-            </a:r>
-            <a:r>
-              <a:rPr lang="en-US" sz="1600" dirty="0" smtClean="0"/>
-              <a:t> a </a:t>
-            </a:r>
-            <a:r>
-              <a:rPr lang="en-US" sz="1600" dirty="0" err="1" smtClean="0"/>
+              <a:rPr lang="en-US" sz="1600" dirty="0" err="1"/>
               <a:t>pontuação</a:t>
             </a:r>
             <a:r>
-              <a:rPr lang="en-US" sz="1600" dirty="0" smtClean="0"/>
+              <a:rPr lang="en-US" sz="1600" dirty="0"/>
               <a:t>.</a:t>
             </a:r>
           </a:p>
@@ -5484,195 +5452,195 @@
           <a:lstStyle/>
           <a:p>
             <a:r>
-              <a:rPr lang="en-US" sz="1600" dirty="0" smtClean="0"/>
+              <a:rPr lang="en-US" sz="1600" dirty="0"/>
               <a:t>O </a:t>
             </a:r>
             <a:r>
-              <a:rPr lang="en-US" sz="1600" dirty="0" err="1" smtClean="0"/>
+              <a:rPr lang="en-US" sz="1600" dirty="0" err="1"/>
               <a:t>problema</a:t>
             </a:r>
             <a:r>
-              <a:rPr lang="en-US" sz="1600" dirty="0" smtClean="0"/>
+              <a:rPr lang="en-US" sz="1600" dirty="0"/>
               <a:t> é NP-</a:t>
             </a:r>
             <a:r>
-              <a:rPr lang="en-US" sz="1600" dirty="0" err="1" smtClean="0"/>
+              <a:rPr lang="en-US" sz="1600" dirty="0" err="1"/>
               <a:t>completo</a:t>
             </a:r>
             <a:r>
-              <a:rPr lang="en-US" sz="1600" dirty="0" smtClean="0"/>
+              <a:rPr lang="en-US" sz="1600" dirty="0"/>
               <a:t>, </a:t>
             </a:r>
             <a:r>
-              <a:rPr lang="en-US" sz="1600" dirty="0" err="1" smtClean="0"/>
+              <a:rPr lang="en-US" sz="1600" dirty="0" err="1"/>
               <a:t>ou</a:t>
             </a:r>
             <a:r>
-              <a:rPr lang="en-US" sz="1600" dirty="0" smtClean="0"/>
+              <a:rPr lang="en-US" sz="1600" dirty="0"/>
               <a:t> </a:t>
             </a:r>
             <a:r>
-              <a:rPr lang="en-US" sz="1600" dirty="0" err="1" smtClean="0"/>
+              <a:rPr lang="en-US" sz="1600" dirty="0" err="1"/>
               <a:t>seja</a:t>
             </a:r>
             <a:r>
-              <a:rPr lang="en-US" sz="1600" dirty="0" smtClean="0"/>
+              <a:rPr lang="en-US" sz="1600" dirty="0"/>
               <a:t>, </a:t>
             </a:r>
             <a:r>
-              <a:rPr lang="en-US" sz="1600" dirty="0" err="1" smtClean="0"/>
+              <a:rPr lang="en-US" sz="1600" dirty="0" err="1"/>
               <a:t>não</a:t>
             </a:r>
             <a:r>
-              <a:rPr lang="en-US" sz="1600" dirty="0" smtClean="0"/>
+              <a:rPr lang="en-US" sz="1600" dirty="0"/>
               <a:t> é </a:t>
             </a:r>
             <a:r>
-              <a:rPr lang="en-US" sz="1600" dirty="0" err="1" smtClean="0"/>
+              <a:rPr lang="en-US" sz="1600" dirty="0" err="1"/>
               <a:t>possível</a:t>
             </a:r>
             <a:r>
-              <a:rPr lang="en-US" sz="1600" dirty="0" smtClean="0"/>
+              <a:rPr lang="en-US" sz="1600" dirty="0"/>
               <a:t> </a:t>
             </a:r>
             <a:r>
-              <a:rPr lang="en-US" sz="1600" dirty="0" err="1" smtClean="0"/>
+              <a:rPr lang="en-US" sz="1600" dirty="0" err="1"/>
               <a:t>encontrar</a:t>
             </a:r>
             <a:r>
-              <a:rPr lang="en-US" sz="1600" dirty="0" smtClean="0"/>
+              <a:rPr lang="en-US" sz="1600" dirty="0"/>
               <a:t> a </a:t>
             </a:r>
             <a:r>
-              <a:rPr lang="en-US" sz="1600" dirty="0" err="1" smtClean="0"/>
+              <a:rPr lang="en-US" sz="1600" dirty="0" err="1"/>
               <a:t>solução</a:t>
             </a:r>
             <a:r>
-              <a:rPr lang="en-US" sz="1600" dirty="0" smtClean="0"/>
+              <a:rPr lang="en-US" sz="1600" dirty="0"/>
               <a:t> </a:t>
             </a:r>
             <a:r>
-              <a:rPr lang="en-US" sz="1600" dirty="0" err="1" smtClean="0"/>
+              <a:rPr lang="en-US" sz="1600" dirty="0" err="1"/>
               <a:t>ótima</a:t>
             </a:r>
             <a:r>
-              <a:rPr lang="en-US" sz="1600" dirty="0" smtClean="0"/>
+              <a:rPr lang="en-US" sz="1600" dirty="0"/>
               <a:t> </a:t>
             </a:r>
             <a:r>
-              <a:rPr lang="en-US" sz="1600" dirty="0" err="1" smtClean="0"/>
+              <a:rPr lang="en-US" sz="1600" dirty="0" err="1"/>
               <a:t>em</a:t>
             </a:r>
             <a:r>
-              <a:rPr lang="en-US" sz="1600" dirty="0" smtClean="0"/>
+              <a:rPr lang="en-US" sz="1600" dirty="0"/>
               <a:t> tempo </a:t>
             </a:r>
             <a:r>
-              <a:rPr lang="en-US" sz="1600" dirty="0" err="1" smtClean="0"/>
+              <a:rPr lang="en-US" sz="1600" dirty="0" err="1"/>
               <a:t>útil</a:t>
             </a:r>
             <a:r>
-              <a:rPr lang="en-US" sz="1600" dirty="0" smtClean="0"/>
+              <a:rPr lang="en-US" sz="1600" dirty="0"/>
               <a:t>, </a:t>
             </a:r>
             <a:r>
-              <a:rPr lang="en-US" sz="1600" dirty="0" err="1" smtClean="0"/>
+              <a:rPr lang="en-US" sz="1600" dirty="0" err="1"/>
               <a:t>pois</a:t>
             </a:r>
             <a:r>
-              <a:rPr lang="en-US" sz="1600" dirty="0" smtClean="0"/>
+              <a:rPr lang="en-US" sz="1600" dirty="0"/>
               <a:t> </a:t>
             </a:r>
             <a:r>
-              <a:rPr lang="en-US" sz="1600" dirty="0" err="1" smtClean="0"/>
+              <a:rPr lang="en-US" sz="1600" dirty="0" err="1"/>
               <a:t>existem</a:t>
             </a:r>
             <a:r>
-              <a:rPr lang="en-US" sz="1600" dirty="0" smtClean="0"/>
+              <a:rPr lang="en-US" sz="1600" dirty="0"/>
               <a:t> </a:t>
             </a:r>
             <a:r>
-              <a:rPr lang="en-US" sz="1600" dirty="0" err="1" smtClean="0"/>
+              <a:rPr lang="en-US" sz="1600" dirty="0" err="1"/>
               <a:t>inúmeras</a:t>
             </a:r>
             <a:r>
-              <a:rPr lang="en-US" sz="1600" dirty="0" smtClean="0"/>
+              <a:rPr lang="en-US" sz="1600" dirty="0"/>
               <a:t> </a:t>
             </a:r>
             <a:r>
-              <a:rPr lang="en-US" sz="1600" dirty="0" err="1" smtClean="0"/>
+              <a:rPr lang="en-US" sz="1600" dirty="0" err="1"/>
               <a:t>combinações</a:t>
             </a:r>
             <a:r>
-              <a:rPr lang="en-US" sz="1600" dirty="0" smtClean="0"/>
+              <a:rPr lang="en-US" sz="1600" dirty="0"/>
               <a:t> </a:t>
             </a:r>
             <a:r>
-              <a:rPr lang="en-US" sz="1600" dirty="0" err="1" smtClean="0"/>
+              <a:rPr lang="en-US" sz="1600" dirty="0" err="1"/>
               <a:t>possíveis</a:t>
             </a:r>
             <a:r>
-              <a:rPr lang="en-US" sz="1600" dirty="0" smtClean="0"/>
+              <a:rPr lang="en-US" sz="1600" dirty="0"/>
               <a:t> para um </a:t>
             </a:r>
             <a:r>
-              <a:rPr lang="en-US" sz="1600" dirty="0" err="1" smtClean="0"/>
+              <a:rPr lang="en-US" sz="1600" dirty="0" err="1"/>
               <a:t>número</a:t>
             </a:r>
             <a:r>
-              <a:rPr lang="en-US" sz="1600" dirty="0" smtClean="0"/>
+              <a:rPr lang="en-US" sz="1600" dirty="0"/>
               <a:t> </a:t>
             </a:r>
             <a:r>
-              <a:rPr lang="en-US" sz="1600" dirty="0" err="1" smtClean="0"/>
+              <a:rPr lang="en-US" sz="1600" dirty="0" err="1"/>
               <a:t>razoável</a:t>
             </a:r>
             <a:r>
-              <a:rPr lang="en-US" sz="1600" dirty="0" smtClean="0"/>
+              <a:rPr lang="en-US" sz="1600" dirty="0"/>
               <a:t> de </a:t>
             </a:r>
             <a:r>
-              <a:rPr lang="en-US" sz="1600" dirty="0" err="1" smtClean="0"/>
+              <a:rPr lang="en-US" sz="1600" dirty="0" err="1"/>
               <a:t>fotografias</a:t>
             </a:r>
             <a:r>
-              <a:rPr lang="en-US" sz="1600" dirty="0" smtClean="0"/>
+              <a:rPr lang="en-US" sz="1600" dirty="0"/>
               <a:t>. O </a:t>
             </a:r>
             <a:r>
-              <a:rPr lang="en-US" sz="1600" dirty="0" err="1" smtClean="0"/>
+              <a:rPr lang="en-US" sz="1600" dirty="0" err="1"/>
               <a:t>objetivo</a:t>
             </a:r>
             <a:r>
-              <a:rPr lang="en-US" sz="1600" dirty="0" smtClean="0"/>
+              <a:rPr lang="en-US" sz="1600" dirty="0"/>
               <a:t> é, </a:t>
             </a:r>
             <a:r>
-              <a:rPr lang="en-US" sz="1600" dirty="0" err="1" smtClean="0"/>
+              <a:rPr lang="en-US" sz="1600" dirty="0" err="1"/>
               <a:t>então</a:t>
             </a:r>
             <a:r>
-              <a:rPr lang="en-US" sz="1600" dirty="0" smtClean="0"/>
+              <a:rPr lang="en-US" sz="1600" dirty="0"/>
               <a:t>, </a:t>
             </a:r>
             <a:r>
-              <a:rPr lang="en-US" sz="1600" dirty="0" err="1" smtClean="0"/>
+              <a:rPr lang="en-US" sz="1600" dirty="0" err="1"/>
               <a:t>maximizar</a:t>
             </a:r>
             <a:r>
-              <a:rPr lang="en-US" sz="1600" dirty="0" smtClean="0"/>
+              <a:rPr lang="en-US" sz="1600" dirty="0"/>
               <a:t> a </a:t>
             </a:r>
             <a:r>
-              <a:rPr lang="en-US" sz="1600" dirty="0" err="1" smtClean="0"/>
+              <a:rPr lang="en-US" sz="1600" dirty="0" err="1"/>
               <a:t>função</a:t>
             </a:r>
             <a:r>
-              <a:rPr lang="en-US" sz="1600" dirty="0" smtClean="0"/>
+              <a:rPr lang="en-US" sz="1600" dirty="0"/>
               <a:t> de </a:t>
             </a:r>
             <a:r>
-              <a:rPr lang="en-US" sz="1600" dirty="0" err="1" smtClean="0"/>
+              <a:rPr lang="en-US" sz="1600" dirty="0" err="1"/>
               <a:t>avaliação</a:t>
             </a:r>
             <a:endParaRPr lang="en-US" b="0" i="0" dirty="0">
@@ -5727,7 +5695,7 @@
                 <a16:creationId xmlns:a16="http://schemas.microsoft.com/office/drawing/2014/main" id="{D6D7A0BC-0046-4CAA-8E7F-DCAFE511EA0E}"/>
               </a:ext>
               <a:ext uri="{C183D7F6-B498-43B3-948B-1728B52AA6E4}">
-                <adec:decorative xmlns="" xmlns:adec="http://schemas.microsoft.com/office/drawing/2017/decorative" val="1"/>
+                <adec:decorative xmlns:adec="http://schemas.microsoft.com/office/drawing/2017/decorative" val="1"/>
               </a:ext>
             </a:extLst>
           </p:cNvPr>
@@ -5862,7 +5830,7 @@
           <a:p>
             <a:pPr rtl="0"/>
             <a:r>
-              <a:rPr lang="pt-PT" sz="2000" b="1" cap="none" dirty="0" smtClean="0">
+              <a:rPr lang="pt-PT" sz="2000" b="1" cap="none" dirty="0">
                 <a:ln w="0"/>
                 <a:effectLst>
                   <a:outerShdw blurRad="38100" dist="25400" dir="5400000" algn="ctr" rotWithShape="0">
@@ -5886,7 +5854,7 @@
                 <a16:creationId xmlns:a16="http://schemas.microsoft.com/office/drawing/2014/main" id="{E7C6334F-6411-41EC-AD7D-179EDD8B58CB}"/>
               </a:ext>
               <a:ext uri="{C183D7F6-B498-43B3-948B-1728B52AA6E4}">
-                <adec:decorative xmlns="" xmlns:adec="http://schemas.microsoft.com/office/drawing/2017/decorative" val="1"/>
+                <adec:decorative xmlns:adec="http://schemas.microsoft.com/office/drawing/2017/decorative" val="1"/>
               </a:ext>
             </a:extLst>
           </p:cNvPr>
@@ -5940,7 +5908,7 @@
                 <a16:creationId xmlns:a16="http://schemas.microsoft.com/office/drawing/2014/main" id="{E6B02CEE-3AF8-4349-9B3E-8970E6DF62B3}"/>
               </a:ext>
               <a:ext uri="{C183D7F6-B498-43B3-948B-1728B52AA6E4}">
-                <adec:decorative xmlns="" xmlns:adec="http://schemas.microsoft.com/office/drawing/2017/decorative" val="1"/>
+                <adec:decorative xmlns:adec="http://schemas.microsoft.com/office/drawing/2017/decorative" val="1"/>
               </a:ext>
             </a:extLst>
           </p:cNvPr>
@@ -5994,7 +5962,7 @@
                 <a16:creationId xmlns:a16="http://schemas.microsoft.com/office/drawing/2014/main" id="{AAA01CF0-3FB5-44EB-B7DE-F2E86374C2FB}"/>
               </a:ext>
               <a:ext uri="{C183D7F6-B498-43B3-948B-1728B52AA6E4}">
-                <adec:decorative xmlns="" xmlns:adec="http://schemas.microsoft.com/office/drawing/2017/decorative" val="1"/>
+                <adec:decorative xmlns:adec="http://schemas.microsoft.com/office/drawing/2017/decorative" val="1"/>
               </a:ext>
             </a:extLst>
           </p:cNvPr>
@@ -6074,151 +6042,151 @@
               </a:lnSpc>
             </a:pPr>
             <a:r>
-              <a:rPr lang="en-US" sz="1600" b="1" dirty="0" smtClean="0"/>
+              <a:rPr lang="en-US" sz="1600" b="1" dirty="0"/>
               <a:t>Restrições</a:t>
             </a:r>
             <a:r>
-              <a:rPr lang="en-US" sz="1600" dirty="0" smtClean="0"/>
+              <a:rPr lang="en-US" sz="1600" dirty="0"/>
               <a:t>: As </a:t>
             </a:r>
             <a:r>
-              <a:rPr lang="en-US" sz="1600" i="1" dirty="0" smtClean="0"/>
+              <a:rPr lang="en-US" sz="1600" i="1" dirty="0"/>
               <a:t>tags </a:t>
             </a:r>
             <a:r>
-              <a:rPr lang="en-US" sz="1600" dirty="0" smtClean="0"/>
+              <a:rPr lang="en-US" sz="1600" dirty="0"/>
               <a:t>de um </a:t>
             </a:r>
             <a:r>
-              <a:rPr lang="en-US" sz="1600" i="1" dirty="0" smtClean="0"/>
+              <a:rPr lang="en-US" sz="1600" i="1" dirty="0"/>
               <a:t>slide</a:t>
             </a:r>
             <a:r>
-              <a:rPr lang="en-US" sz="1600" dirty="0" smtClean="0"/>
+              <a:rPr lang="en-US" sz="1600" dirty="0"/>
               <a:t> </a:t>
             </a:r>
             <a:r>
-              <a:rPr lang="en-US" sz="1600" dirty="0" err="1" smtClean="0"/>
+              <a:rPr lang="en-US" sz="1600" dirty="0" err="1"/>
               <a:t>correspondem</a:t>
             </a:r>
             <a:r>
-              <a:rPr lang="en-US" sz="1600" dirty="0" smtClean="0"/>
+              <a:rPr lang="en-US" sz="1600" dirty="0"/>
               <a:t> </a:t>
             </a:r>
             <a:r>
-              <a:rPr lang="en-US" sz="1600" dirty="0" err="1" smtClean="0"/>
+              <a:rPr lang="en-US" sz="1600" dirty="0" err="1"/>
               <a:t>às</a:t>
             </a:r>
             <a:r>
-              <a:rPr lang="en-US" sz="1600" dirty="0" smtClean="0"/>
+              <a:rPr lang="en-US" sz="1600" dirty="0"/>
               <a:t> </a:t>
             </a:r>
             <a:r>
-              <a:rPr lang="en-US" sz="1600" i="1" dirty="0" smtClean="0"/>
+              <a:rPr lang="en-US" sz="1600" i="1" dirty="0"/>
               <a:t>tags </a:t>
             </a:r>
             <a:r>
-              <a:rPr lang="en-US" sz="1600" dirty="0" smtClean="0"/>
+              <a:rPr lang="en-US" sz="1600" dirty="0"/>
               <a:t>das fotografias que </a:t>
             </a:r>
             <a:r>
-              <a:rPr lang="en-US" sz="1600" dirty="0" err="1" smtClean="0"/>
+              <a:rPr lang="en-US" sz="1600" dirty="0" err="1"/>
               <a:t>constituem</a:t>
             </a:r>
             <a:r>
-              <a:rPr lang="en-US" sz="1600" dirty="0" smtClean="0"/>
+              <a:rPr lang="en-US" sz="1600" dirty="0"/>
               <a:t> o </a:t>
             </a:r>
             <a:r>
-              <a:rPr lang="en-US" sz="1600" dirty="0" err="1" smtClean="0"/>
+              <a:rPr lang="en-US" sz="1600" dirty="0" err="1"/>
               <a:t>próprio</a:t>
             </a:r>
             <a:r>
-              <a:rPr lang="en-US" sz="1600" dirty="0" smtClean="0"/>
+              <a:rPr lang="en-US" sz="1600" dirty="0"/>
               <a:t> </a:t>
             </a:r>
             <a:r>
-              <a:rPr lang="en-US" sz="1600" i="1" dirty="0" smtClean="0"/>
+              <a:rPr lang="en-US" sz="1600" i="1" dirty="0"/>
               <a:t>slide. </a:t>
             </a:r>
             <a:r>
-              <a:rPr lang="en-US" sz="1600" dirty="0" smtClean="0"/>
+              <a:rPr lang="en-US" sz="1600" dirty="0"/>
               <a:t>Cada </a:t>
             </a:r>
             <a:r>
-              <a:rPr lang="en-US" sz="1600" i="1" dirty="0" smtClean="0"/>
+              <a:rPr lang="en-US" sz="1600" i="1" dirty="0"/>
               <a:t>slide </a:t>
             </a:r>
             <a:r>
-              <a:rPr lang="en-US" sz="1600" dirty="0" smtClean="0"/>
+              <a:rPr lang="en-US" sz="1600" dirty="0"/>
               <a:t>é </a:t>
             </a:r>
             <a:r>
-              <a:rPr lang="en-US" sz="1600" dirty="0" err="1" smtClean="0"/>
+              <a:rPr lang="en-US" sz="1600" dirty="0" err="1"/>
               <a:t>composto</a:t>
             </a:r>
             <a:r>
-              <a:rPr lang="en-US" sz="1600" dirty="0" smtClean="0"/>
+              <a:rPr lang="en-US" sz="1600" dirty="0"/>
               <a:t> </a:t>
             </a:r>
             <a:r>
-              <a:rPr lang="en-US" sz="1600" dirty="0" err="1" smtClean="0"/>
+              <a:rPr lang="en-US" sz="1600" dirty="0" err="1"/>
               <a:t>por</a:t>
             </a:r>
             <a:r>
-              <a:rPr lang="en-US" sz="1600" dirty="0" smtClean="0"/>
+              <a:rPr lang="en-US" sz="1600" dirty="0"/>
               <a:t> uma </a:t>
             </a:r>
             <a:r>
-              <a:rPr lang="en-US" sz="1600" dirty="0" err="1" smtClean="0"/>
+              <a:rPr lang="en-US" sz="1600" dirty="0" err="1"/>
               <a:t>única</a:t>
             </a:r>
             <a:r>
-              <a:rPr lang="en-US" sz="1600" dirty="0" smtClean="0"/>
+              <a:rPr lang="en-US" sz="1600" dirty="0"/>
               <a:t> </a:t>
             </a:r>
             <a:r>
-              <a:rPr lang="en-US" sz="1600" dirty="0" err="1" smtClean="0"/>
+              <a:rPr lang="en-US" sz="1600" dirty="0" err="1"/>
               <a:t>imagem</a:t>
             </a:r>
             <a:r>
-              <a:rPr lang="en-US" sz="1600" dirty="0" smtClean="0"/>
+              <a:rPr lang="en-US" sz="1600" dirty="0"/>
               <a:t> horizontal </a:t>
             </a:r>
             <a:r>
-              <a:rPr lang="en-US" sz="1600" dirty="0" err="1" smtClean="0"/>
+              <a:rPr lang="en-US" sz="1600" dirty="0" err="1"/>
               <a:t>ou</a:t>
             </a:r>
             <a:r>
-              <a:rPr lang="en-US" sz="1600" dirty="0" smtClean="0"/>
+              <a:rPr lang="en-US" sz="1600" dirty="0"/>
               <a:t> </a:t>
             </a:r>
             <a:r>
-              <a:rPr lang="en-US" sz="1600" dirty="0" err="1" smtClean="0"/>
+              <a:rPr lang="en-US" sz="1600" dirty="0" err="1"/>
               <a:t>duas</a:t>
             </a:r>
             <a:r>
-              <a:rPr lang="en-US" sz="1600" dirty="0" smtClean="0"/>
+              <a:rPr lang="en-US" sz="1600" dirty="0"/>
               <a:t> </a:t>
             </a:r>
             <a:r>
-              <a:rPr lang="en-US" sz="1600" dirty="0" err="1" smtClean="0"/>
+              <a:rPr lang="en-US" sz="1600" dirty="0" err="1"/>
               <a:t>verticais</a:t>
             </a:r>
             <a:r>
-              <a:rPr lang="en-US" sz="1600" dirty="0" smtClean="0"/>
+              <a:rPr lang="en-US" sz="1600" dirty="0"/>
               <a:t>. Uma </a:t>
             </a:r>
             <a:r>
-              <a:rPr lang="en-US" sz="1600" dirty="0" err="1" smtClean="0"/>
+              <a:rPr lang="en-US" sz="1600" dirty="0" err="1"/>
               <a:t>fotografia</a:t>
             </a:r>
             <a:r>
-              <a:rPr lang="en-US" sz="1600" dirty="0" smtClean="0"/>
+              <a:rPr lang="en-US" sz="1600" dirty="0"/>
               <a:t> </a:t>
             </a:r>
             <a:r>
-              <a:rPr lang="en-US" sz="1600" dirty="0" err="1" smtClean="0"/>
+              <a:rPr lang="en-US" sz="1600" dirty="0" err="1"/>
               <a:t>pode</a:t>
             </a:r>
             <a:r>
@@ -6226,83 +6194,83 @@
               <a:t> </a:t>
             </a:r>
             <a:r>
-              <a:rPr lang="en-US" sz="1600" dirty="0" err="1" smtClean="0"/>
+              <a:rPr lang="en-US" sz="1600" dirty="0" err="1"/>
               <a:t>não</a:t>
             </a:r>
             <a:r>
-              <a:rPr lang="en-US" sz="1600" dirty="0" smtClean="0"/>
+              <a:rPr lang="en-US" sz="1600" dirty="0"/>
               <a:t> </a:t>
             </a:r>
             <a:r>
-              <a:rPr lang="en-US" sz="1600" dirty="0" err="1" smtClean="0"/>
+              <a:rPr lang="en-US" sz="1600" dirty="0" err="1"/>
               <a:t>ser</a:t>
             </a:r>
             <a:r>
-              <a:rPr lang="en-US" sz="1600" dirty="0" smtClean="0"/>
+              <a:rPr lang="en-US" sz="1600" dirty="0"/>
               <a:t> </a:t>
             </a:r>
             <a:r>
-              <a:rPr lang="en-US" sz="1600" dirty="0" err="1" smtClean="0"/>
+              <a:rPr lang="en-US" sz="1600" dirty="0" err="1"/>
               <a:t>usada</a:t>
             </a:r>
             <a:r>
-              <a:rPr lang="en-US" sz="1600" dirty="0" smtClean="0"/>
+              <a:rPr lang="en-US" sz="1600" dirty="0"/>
               <a:t> </a:t>
             </a:r>
             <a:r>
-              <a:rPr lang="en-US" sz="1600" dirty="0" err="1" smtClean="0"/>
+              <a:rPr lang="en-US" sz="1600" dirty="0" err="1"/>
               <a:t>ou</a:t>
             </a:r>
             <a:r>
-              <a:rPr lang="en-US" sz="1600" dirty="0" smtClean="0"/>
+              <a:rPr lang="en-US" sz="1600" dirty="0"/>
               <a:t> </a:t>
             </a:r>
             <a:r>
-              <a:rPr lang="en-US" sz="1600" dirty="0" err="1" smtClean="0"/>
+              <a:rPr lang="en-US" sz="1600" dirty="0" err="1"/>
               <a:t>usada</a:t>
             </a:r>
             <a:r>
-              <a:rPr lang="en-US" sz="1600" dirty="0" smtClean="0"/>
+              <a:rPr lang="en-US" sz="1600" dirty="0"/>
               <a:t> uma </a:t>
             </a:r>
             <a:r>
-              <a:rPr lang="en-US" sz="1600" dirty="0" err="1" smtClean="0"/>
+              <a:rPr lang="en-US" sz="1600" dirty="0" err="1"/>
               <a:t>vez</a:t>
             </a:r>
             <a:r>
-              <a:rPr lang="en-US" sz="1600" dirty="0" smtClean="0"/>
+              <a:rPr lang="en-US" sz="1600" dirty="0"/>
               <a:t>. Cada </a:t>
             </a:r>
             <a:r>
-              <a:rPr lang="en-US" sz="1600" i="1" dirty="0" smtClean="0"/>
+              <a:rPr lang="en-US" sz="1600" i="1" dirty="0"/>
               <a:t>slideshow</a:t>
             </a:r>
             <a:r>
-              <a:rPr lang="en-US" sz="1600" dirty="0" smtClean="0"/>
+              <a:rPr lang="en-US" sz="1600" dirty="0"/>
               <a:t> tem </a:t>
             </a:r>
             <a:r>
-              <a:rPr lang="en-US" sz="1600" dirty="0" err="1" smtClean="0"/>
+              <a:rPr lang="en-US" sz="1600" dirty="0" err="1"/>
               <a:t>pelo</a:t>
             </a:r>
             <a:r>
-              <a:rPr lang="en-US" sz="1600" dirty="0" smtClean="0"/>
+              <a:rPr lang="en-US" sz="1600" dirty="0"/>
               <a:t> </a:t>
             </a:r>
             <a:r>
-              <a:rPr lang="en-US" sz="1600" dirty="0" err="1" smtClean="0"/>
+              <a:rPr lang="en-US" sz="1600" dirty="0" err="1"/>
               <a:t>menos</a:t>
             </a:r>
             <a:r>
-              <a:rPr lang="en-US" sz="1600" dirty="0" smtClean="0"/>
+              <a:rPr lang="en-US" sz="1600" dirty="0"/>
               <a:t> um </a:t>
             </a:r>
             <a:r>
-              <a:rPr lang="en-US" sz="1600" i="1" dirty="0" smtClean="0"/>
+              <a:rPr lang="en-US" sz="1600" i="1" dirty="0"/>
               <a:t>slide.</a:t>
             </a:r>
             <a:r>
-              <a:rPr lang="en-US" sz="1600" dirty="0" smtClean="0"/>
+              <a:rPr lang="en-US" sz="1600" dirty="0"/>
               <a:t>  </a:t>
             </a:r>
           </a:p>
@@ -6342,230 +6310,249 @@
               </a:lnSpc>
             </a:pPr>
             <a:r>
-              <a:rPr lang="en-US" sz="1600" b="1" dirty="0" err="1" smtClean="0"/>
+              <a:rPr lang="en-US" sz="1600" b="1" dirty="0" err="1"/>
               <a:t>Representação</a:t>
             </a:r>
             <a:r>
-              <a:rPr lang="en-US" sz="1600" b="1" dirty="0" smtClean="0"/>
+              <a:rPr lang="en-US" sz="1600" b="1" dirty="0"/>
               <a:t> da </a:t>
             </a:r>
             <a:r>
-              <a:rPr lang="en-US" sz="1600" b="1" dirty="0" err="1" smtClean="0"/>
+              <a:rPr lang="en-US" sz="1600" b="1" dirty="0" err="1"/>
               <a:t>solução</a:t>
             </a:r>
             <a:r>
-              <a:rPr lang="en-US" sz="1600" b="1" dirty="0" smtClean="0"/>
+              <a:rPr lang="en-US" sz="1600" b="1" dirty="0"/>
               <a:t>: </a:t>
             </a:r>
             <a:r>
-              <a:rPr lang="en-US" sz="1600" dirty="0" smtClean="0"/>
+              <a:rPr lang="en-US" sz="1600" dirty="0"/>
               <a:t>O </a:t>
             </a:r>
             <a:r>
-              <a:rPr lang="en-US" sz="1600" dirty="0" err="1" smtClean="0"/>
+              <a:rPr lang="en-US" sz="1600" dirty="0" err="1"/>
               <a:t>ficheiro</a:t>
             </a:r>
             <a:r>
-              <a:rPr lang="en-US" sz="1600" dirty="0" smtClean="0"/>
+              <a:rPr lang="en-US" sz="1600" dirty="0"/>
+              <a:t> final de </a:t>
+            </a:r>
+            <a:r>
+              <a:rPr lang="en-US" sz="1600" i="1" dirty="0"/>
+              <a:t>output</a:t>
+            </a:r>
+            <a:r>
+              <a:rPr lang="en-US" sz="1600" dirty="0"/>
               <a:t> </a:t>
             </a:r>
             <a:r>
-              <a:rPr lang="en-US" sz="1600" i="1" dirty="0" smtClean="0"/>
-              <a:t>output</a:t>
-            </a:r>
-            <a:r>
-              <a:rPr lang="en-US" sz="1600" dirty="0" smtClean="0"/>
+              <a:rPr lang="en-US" sz="1600" dirty="0" err="1"/>
+              <a:t>deve</a:t>
+            </a:r>
+            <a:r>
+              <a:rPr lang="en-US" sz="1600" dirty="0"/>
               <a:t> </a:t>
             </a:r>
             <a:r>
-              <a:rPr lang="en-US" sz="1600" dirty="0" err="1" smtClean="0"/>
-              <a:t>deve</a:t>
-            </a:r>
-            <a:r>
-              <a:rPr lang="en-US" sz="1600" dirty="0" smtClean="0"/>
+              <a:rPr lang="en-US" sz="1600" dirty="0" err="1"/>
+              <a:t>começar</a:t>
+            </a:r>
+            <a:r>
+              <a:rPr lang="en-US" sz="1600" dirty="0"/>
+              <a:t> com um </a:t>
+            </a:r>
+            <a:r>
+              <a:rPr lang="en-US" sz="1600" dirty="0" err="1"/>
+              <a:t>inteiro</a:t>
+            </a:r>
+            <a:r>
+              <a:rPr lang="en-US" sz="1600" dirty="0"/>
+              <a:t> S (1 &lt;= S &lt;= N), que </a:t>
+            </a:r>
+            <a:r>
+              <a:rPr lang="en-US" sz="1600" dirty="0" err="1"/>
+              <a:t>representa</a:t>
+            </a:r>
+            <a:r>
+              <a:rPr lang="en-US" sz="1600" dirty="0"/>
+              <a:t> o </a:t>
+            </a:r>
+            <a:r>
+              <a:rPr lang="en-US" sz="1600" dirty="0" err="1"/>
+              <a:t>número</a:t>
+            </a:r>
+            <a:r>
+              <a:rPr lang="en-US" sz="1600" dirty="0"/>
+              <a:t> de </a:t>
+            </a:r>
+            <a:r>
+              <a:rPr lang="en-US" sz="1600" i="1" dirty="0"/>
+              <a:t>slides.</a:t>
+            </a:r>
+            <a:r>
+              <a:rPr lang="en-US" sz="1600" dirty="0"/>
               <a:t> </a:t>
             </a:r>
             <a:r>
-              <a:rPr lang="en-US" sz="1600" dirty="0" err="1" smtClean="0"/>
-              <a:t>começar</a:t>
-            </a:r>
-            <a:r>
-              <a:rPr lang="en-US" sz="1600" dirty="0" smtClean="0"/>
-              <a:t> com um </a:t>
-            </a:r>
-            <a:r>
-              <a:rPr lang="en-US" sz="1600" dirty="0" err="1" smtClean="0"/>
+              <a:rPr lang="en-US" sz="1600" dirty="0" err="1"/>
+              <a:t>Isto</a:t>
+            </a:r>
+            <a:r>
+              <a:rPr lang="en-US" sz="1600" dirty="0"/>
+              <a:t> é </a:t>
+            </a:r>
+            <a:r>
+              <a:rPr lang="en-US" sz="1600" dirty="0" err="1"/>
+              <a:t>seguido</a:t>
+            </a:r>
+            <a:r>
+              <a:rPr lang="en-US" sz="1600" dirty="0"/>
+              <a:t> de S </a:t>
+            </a:r>
+            <a:r>
+              <a:rPr lang="en-US" sz="1600" dirty="0" err="1"/>
+              <a:t>linhas</a:t>
+            </a:r>
+            <a:r>
+              <a:rPr lang="en-US" sz="1600" dirty="0"/>
+              <a:t>, que </a:t>
+            </a:r>
+            <a:r>
+              <a:rPr lang="en-US" sz="1600" dirty="0" err="1"/>
+              <a:t>descrevem</a:t>
+            </a:r>
+            <a:r>
+              <a:rPr lang="en-US" sz="1600" dirty="0"/>
+              <a:t>, </a:t>
+            </a:r>
+            <a:r>
+              <a:rPr lang="en-US" sz="1600" dirty="0" err="1"/>
+              <a:t>individualmente</a:t>
+            </a:r>
+            <a:r>
+              <a:rPr lang="en-US" sz="1600" dirty="0"/>
+              <a:t>, </a:t>
+            </a:r>
+            <a:r>
+              <a:rPr lang="en-US" sz="1600" dirty="0" err="1"/>
+              <a:t>cada</a:t>
+            </a:r>
+            <a:r>
+              <a:rPr lang="en-US" sz="1600" dirty="0"/>
+              <a:t> </a:t>
+            </a:r>
+            <a:r>
+              <a:rPr lang="en-US" sz="1600" i="1" dirty="0"/>
+              <a:t>slide. </a:t>
+            </a:r>
+            <a:r>
+              <a:rPr lang="en-US" sz="1600" dirty="0" err="1"/>
+              <a:t>Cada</a:t>
+            </a:r>
+            <a:r>
+              <a:rPr lang="en-US" sz="1600" dirty="0"/>
+              <a:t> </a:t>
+            </a:r>
+            <a:r>
+              <a:rPr lang="en-US" sz="1600" dirty="0" err="1"/>
+              <a:t>linha</a:t>
+            </a:r>
+            <a:r>
+              <a:rPr lang="en-US" sz="1600" dirty="0"/>
+              <a:t> </a:t>
+            </a:r>
+            <a:r>
+              <a:rPr lang="en-US" sz="1600" dirty="0" err="1"/>
+              <a:t>pode</a:t>
+            </a:r>
+            <a:r>
+              <a:rPr lang="en-US" sz="1600" dirty="0"/>
+              <a:t> </a:t>
+            </a:r>
+            <a:r>
+              <a:rPr lang="en-US" sz="1600" dirty="0" err="1"/>
+              <a:t>conter</a:t>
+            </a:r>
+            <a:r>
+              <a:rPr lang="en-US" sz="1600" dirty="0"/>
+              <a:t> 1 </a:t>
+            </a:r>
+            <a:r>
+              <a:rPr lang="en-US" sz="1600" dirty="0" err="1"/>
               <a:t>inteiro</a:t>
             </a:r>
             <a:r>
-              <a:rPr lang="en-US" sz="1600" dirty="0" smtClean="0"/>
-              <a:t> S (1 &lt;= S &lt;= N), que </a:t>
-            </a:r>
-            <a:r>
-              <a:rPr lang="en-US" sz="1600" dirty="0" err="1" smtClean="0"/>
-              <a:t>representa</a:t>
-            </a:r>
-            <a:r>
-              <a:rPr lang="en-US" sz="1600" dirty="0" smtClean="0"/>
-              <a:t> o </a:t>
-            </a:r>
-            <a:r>
-              <a:rPr lang="en-US" sz="1600" dirty="0" err="1" smtClean="0"/>
-              <a:t>número</a:t>
-            </a:r>
-            <a:r>
-              <a:rPr lang="en-US" sz="1600" dirty="0" smtClean="0"/>
+              <a:rPr lang="en-US" sz="1600" dirty="0"/>
+              <a:t>, </a:t>
+            </a:r>
+            <a:r>
+              <a:rPr lang="en-US" sz="1600" dirty="0" err="1"/>
+              <a:t>ou</a:t>
+            </a:r>
+            <a:r>
+              <a:rPr lang="en-US" sz="1600" dirty="0"/>
+              <a:t> </a:t>
+            </a:r>
+            <a:r>
+              <a:rPr lang="en-US" sz="1600" dirty="0" err="1"/>
+              <a:t>dois</a:t>
+            </a:r>
+            <a:r>
+              <a:rPr lang="en-US" sz="1600" dirty="0"/>
+              <a:t> </a:t>
+            </a:r>
+            <a:r>
+              <a:rPr lang="en-US" sz="1600" dirty="0" err="1"/>
+              <a:t>separados</a:t>
+            </a:r>
+            <a:r>
+              <a:rPr lang="en-US" sz="1600" dirty="0"/>
+              <a:t> por um </a:t>
+            </a:r>
+            <a:r>
+              <a:rPr lang="en-US" sz="1600" dirty="0" err="1"/>
+              <a:t>espaço</a:t>
+            </a:r>
+            <a:r>
+              <a:rPr lang="en-US" sz="1600" dirty="0"/>
+              <a:t>. Durante a </a:t>
+            </a:r>
+            <a:r>
+              <a:rPr lang="en-US" sz="1600" dirty="0" err="1"/>
+              <a:t>procura</a:t>
+            </a:r>
+            <a:r>
+              <a:rPr lang="en-US" sz="1600" dirty="0"/>
               <a:t> de </a:t>
             </a:r>
             <a:r>
-              <a:rPr lang="en-US" sz="1600" i="1" dirty="0" smtClean="0"/>
-              <a:t>slides.</a:t>
-            </a:r>
-            <a:r>
-              <a:rPr lang="en-US" sz="1600" dirty="0" smtClean="0"/>
+              <a:rPr lang="en-US" sz="1600" dirty="0" err="1"/>
+              <a:t>soluções</a:t>
+            </a:r>
+            <a:r>
+              <a:rPr lang="en-US" sz="1600" dirty="0"/>
               <a:t> </a:t>
             </a:r>
             <a:r>
-              <a:rPr lang="en-US" sz="1600" dirty="0" err="1" smtClean="0"/>
-              <a:t>Isto</a:t>
-            </a:r>
-            <a:r>
-              <a:rPr lang="en-US" sz="1600" dirty="0" smtClean="0"/>
-              <a:t> é </a:t>
-            </a:r>
-            <a:r>
-              <a:rPr lang="en-US" sz="1600" dirty="0" err="1" smtClean="0"/>
-              <a:t>seguido</a:t>
-            </a:r>
-            <a:r>
-              <a:rPr lang="en-US" sz="1600" dirty="0" smtClean="0"/>
-              <a:t> de S </a:t>
-            </a:r>
-            <a:r>
-              <a:rPr lang="en-US" sz="1600" dirty="0" err="1" smtClean="0"/>
-              <a:t>linhas</a:t>
-            </a:r>
-            <a:r>
-              <a:rPr lang="en-US" sz="1600" dirty="0" smtClean="0"/>
-              <a:t>, que </a:t>
-            </a:r>
-            <a:r>
-              <a:rPr lang="en-US" sz="1600" dirty="0" err="1" smtClean="0"/>
-              <a:t>descrevem</a:t>
-            </a:r>
-            <a:r>
-              <a:rPr lang="en-US" sz="1600" dirty="0" smtClean="0"/>
-              <a:t>, </a:t>
-            </a:r>
-            <a:r>
-              <a:rPr lang="en-US" sz="1600" dirty="0" err="1" smtClean="0"/>
-              <a:t>individualmente</a:t>
-            </a:r>
-            <a:r>
-              <a:rPr lang="en-US" sz="1600" dirty="0" smtClean="0"/>
-              <a:t>, </a:t>
-            </a:r>
-            <a:r>
-              <a:rPr lang="en-US" sz="1600" dirty="0" err="1" smtClean="0"/>
-              <a:t>cada</a:t>
-            </a:r>
-            <a:r>
-              <a:rPr lang="en-US" sz="1600" dirty="0" smtClean="0"/>
+              <a:rPr lang="en-US" sz="1600" dirty="0" err="1"/>
+              <a:t>em</a:t>
+            </a:r>
+            <a:r>
+              <a:rPr lang="en-US" sz="1600" dirty="0"/>
               <a:t> </a:t>
             </a:r>
             <a:r>
-              <a:rPr lang="en-US" sz="1600" i="1" dirty="0" smtClean="0"/>
-              <a:t>slide. </a:t>
-            </a:r>
-            <a:r>
-              <a:rPr lang="en-US" sz="1600" dirty="0" err="1" smtClean="0"/>
-              <a:t>Cada</a:t>
-            </a:r>
-            <a:r>
-              <a:rPr lang="en-US" sz="1600" dirty="0" smtClean="0"/>
+              <a:rPr lang="en-US" sz="1600" dirty="0" err="1"/>
+              <a:t>algoritmos</a:t>
+            </a:r>
+            <a:r>
+              <a:rPr lang="en-US" sz="1600" dirty="0"/>
+              <a:t> com </a:t>
+            </a:r>
+            <a:r>
+              <a:rPr lang="pt-PT" sz="1600" dirty="0"/>
               <a:t> </a:t>
             </a:r>
-            <a:r>
-              <a:rPr lang="en-US" sz="1600" dirty="0" err="1" smtClean="0"/>
-              <a:t>linha</a:t>
-            </a:r>
-            <a:r>
-              <a:rPr lang="en-US" sz="1600" dirty="0" smtClean="0"/>
-              <a:t> </a:t>
-            </a:r>
-            <a:r>
-              <a:rPr lang="en-US" sz="1600" dirty="0" err="1" smtClean="0"/>
-              <a:t>pode</a:t>
-            </a:r>
-            <a:r>
-              <a:rPr lang="en-US" sz="1600" dirty="0" smtClean="0"/>
-              <a:t> </a:t>
-            </a:r>
-            <a:r>
-              <a:rPr lang="en-US" sz="1600" dirty="0" err="1" smtClean="0"/>
-              <a:t>conter</a:t>
-            </a:r>
-            <a:r>
-              <a:rPr lang="en-US" sz="1600" dirty="0" smtClean="0"/>
-              <a:t> 1 </a:t>
-            </a:r>
-            <a:r>
-              <a:rPr lang="en-US" sz="1600" dirty="0" err="1" smtClean="0"/>
-              <a:t>inteiro</a:t>
-            </a:r>
-            <a:r>
-              <a:rPr lang="en-US" sz="1600" dirty="0" smtClean="0"/>
-              <a:t>, </a:t>
-            </a:r>
-            <a:r>
-              <a:rPr lang="en-US" sz="1600" dirty="0" err="1" smtClean="0"/>
-              <a:t>ou</a:t>
-            </a:r>
-            <a:r>
-              <a:rPr lang="en-US" sz="1600" dirty="0" smtClean="0"/>
-              <a:t> </a:t>
-            </a:r>
-            <a:r>
-              <a:rPr lang="en-US" sz="1600" dirty="0" err="1" smtClean="0"/>
-              <a:t>dois</a:t>
-            </a:r>
-            <a:r>
-              <a:rPr lang="en-US" sz="1600" dirty="0" smtClean="0"/>
-              <a:t> </a:t>
-            </a:r>
-            <a:r>
-              <a:rPr lang="en-US" sz="1600" dirty="0" err="1" smtClean="0"/>
-              <a:t>separados</a:t>
-            </a:r>
-            <a:r>
-              <a:rPr lang="en-US" sz="1600" dirty="0" smtClean="0"/>
-              <a:t> </a:t>
-            </a:r>
-            <a:r>
-              <a:rPr lang="en-US" sz="1600" dirty="0" err="1" smtClean="0"/>
-              <a:t>por</a:t>
-            </a:r>
-            <a:r>
-              <a:rPr lang="en-US" sz="1600" dirty="0" smtClean="0"/>
-              <a:t> um </a:t>
-            </a:r>
-            <a:r>
-              <a:rPr lang="en-US" sz="1600" dirty="0" err="1" smtClean="0"/>
-              <a:t>espaço</a:t>
-            </a:r>
-            <a:r>
-              <a:rPr lang="en-US" sz="1600" dirty="0" smtClean="0"/>
-              <a:t>.</a:t>
-            </a:r>
-            <a:r>
-              <a:rPr lang="en-US" sz="1600" i="1" dirty="0" smtClean="0"/>
-              <a:t> </a:t>
-            </a:r>
-            <a:r>
-              <a:rPr lang="pt-PT" sz="1600" dirty="0" smtClean="0"/>
-              <a:t> </a:t>
-            </a:r>
-            <a:endParaRPr lang="pt-PT" sz="1600" dirty="0"/>
           </a:p>
           <a:p>
             <a:pPr algn="just">
@@ -6574,7 +6561,7 @@
               </a:lnSpc>
             </a:pPr>
             <a:r>
-              <a:rPr lang="en-US" sz="1600" dirty="0" smtClean="0"/>
+              <a:rPr lang="en-US" sz="1600" dirty="0"/>
               <a:t> </a:t>
             </a:r>
           </a:p>
@@ -6607,32 +6594,12 @@
               </a:lnSpc>
             </a:pPr>
             <a:r>
-              <a:rPr lang="pt-PT" sz="1600" b="1" dirty="0" smtClean="0"/>
+              <a:rPr lang="pt-PT" sz="1600" b="1" dirty="0"/>
               <a:t>Função de avaliação: </a:t>
             </a:r>
             <a:r>
-              <a:rPr lang="pt-PT" sz="1600" dirty="0" smtClean="0"/>
-              <a:t>definida </a:t>
-            </a:r>
-            <a:r>
               <a:rPr lang="pt-PT" sz="1600" dirty="0"/>
-              <a:t>pelo  fator de interesse da transição entre diapositivos</a:t>
-            </a:r>
-            <a:r>
-              <a:rPr lang="pt-PT" sz="1600" dirty="0" smtClean="0"/>
-              <a:t>. </a:t>
-            </a:r>
-            <a:r>
-              <a:rPr lang="pt-PT" sz="1600" dirty="0"/>
-              <a:t>Será calculado como o mínimo entre</a:t>
-            </a:r>
-            <a:r>
-              <a:rPr lang="pt-PT" sz="1600" dirty="0" smtClean="0"/>
-              <a:t>: número </a:t>
-            </a:r>
-            <a:r>
-              <a:rPr lang="pt-PT" sz="1600" dirty="0"/>
-              <a:t>de </a:t>
+              <a:t>definida pelo  fator de interesse da transição entre diapositivos. Será calculado como o mínimo entre: número de </a:t>
             </a:r>
             <a:r>
               <a:rPr lang="pt-PT" sz="1600" i="1" dirty="0" err="1"/>
@@ -6648,15 +6615,7 @@
             </a:r>
             <a:r>
               <a:rPr lang="pt-PT" sz="1600" dirty="0"/>
-              <a:t> </a:t>
-            </a:r>
-            <a:r>
-              <a:rPr lang="pt-PT" sz="1600" dirty="0" smtClean="0"/>
-              <a:t>; numero </a:t>
-            </a:r>
-            <a:r>
-              <a:rPr lang="pt-PT" sz="1600" dirty="0"/>
-              <a:t>de </a:t>
+              <a:t> ; numero de </a:t>
             </a:r>
             <a:r>
               <a:rPr lang="pt-PT" sz="1600" i="1" dirty="0" err="1"/>
@@ -6672,15 +6631,7 @@
             </a:r>
             <a:r>
               <a:rPr lang="pt-PT" sz="1600" dirty="0"/>
-              <a:t> </a:t>
-            </a:r>
-            <a:r>
-              <a:rPr lang="pt-PT" sz="1600" dirty="0" smtClean="0"/>
-              <a:t>; numero </a:t>
-            </a:r>
-            <a:r>
-              <a:rPr lang="pt-PT" sz="1600" dirty="0"/>
-              <a:t>de </a:t>
+              <a:t> ; numero de </a:t>
             </a:r>
             <a:r>
               <a:rPr lang="pt-PT" sz="1600" i="1" dirty="0" err="1"/>
@@ -6746,7 +6697,7 @@
                 <a16:creationId xmlns:a16="http://schemas.microsoft.com/office/drawing/2014/main" id="{D6D7A0BC-0046-4CAA-8E7F-DCAFE511EA0E}"/>
               </a:ext>
               <a:ext uri="{C183D7F6-B498-43B3-948B-1728B52AA6E4}">
-                <adec:decorative xmlns="" xmlns:adec="http://schemas.microsoft.com/office/drawing/2017/decorative" val="1"/>
+                <adec:decorative xmlns:adec="http://schemas.microsoft.com/office/drawing/2017/decorative" val="1"/>
               </a:ext>
             </a:extLst>
           </p:cNvPr>
@@ -6881,7 +6832,7 @@
           <a:p>
             <a:pPr rtl="0"/>
             <a:r>
-              <a:rPr lang="pt-PT" sz="2000" b="1" cap="none" dirty="0" smtClean="0">
+              <a:rPr lang="pt-PT" sz="2000" b="1" cap="none" dirty="0">
                 <a:ln w="0"/>
                 <a:effectLst>
                   <a:outerShdw blurRad="38100" dist="25400" dir="5400000" algn="ctr" rotWithShape="0">
@@ -6905,7 +6856,7 @@
                 <a16:creationId xmlns:a16="http://schemas.microsoft.com/office/drawing/2014/main" id="{E7C6334F-6411-41EC-AD7D-179EDD8B58CB}"/>
               </a:ext>
               <a:ext uri="{C183D7F6-B498-43B3-948B-1728B52AA6E4}">
-                <adec:decorative xmlns="" xmlns:adec="http://schemas.microsoft.com/office/drawing/2017/decorative" val="1"/>
+                <adec:decorative xmlns:adec="http://schemas.microsoft.com/office/drawing/2017/decorative" val="1"/>
               </a:ext>
             </a:extLst>
           </p:cNvPr>
@@ -6959,7 +6910,7 @@
                 <a16:creationId xmlns:a16="http://schemas.microsoft.com/office/drawing/2014/main" id="{E6B02CEE-3AF8-4349-9B3E-8970E6DF62B3}"/>
               </a:ext>
               <a:ext uri="{C183D7F6-B498-43B3-948B-1728B52AA6E4}">
-                <adec:decorative xmlns="" xmlns:adec="http://schemas.microsoft.com/office/drawing/2017/decorative" val="1"/>
+                <adec:decorative xmlns:adec="http://schemas.microsoft.com/office/drawing/2017/decorative" val="1"/>
               </a:ext>
             </a:extLst>
           </p:cNvPr>
@@ -7013,7 +6964,7 @@
                 <a16:creationId xmlns:a16="http://schemas.microsoft.com/office/drawing/2014/main" id="{AAA01CF0-3FB5-44EB-B7DE-F2E86374C2FB}"/>
               </a:ext>
               <a:ext uri="{C183D7F6-B498-43B3-948B-1728B52AA6E4}">
-                <adec:decorative xmlns="" xmlns:adec="http://schemas.microsoft.com/office/drawing/2017/decorative" val="1"/>
+                <adec:decorative xmlns:adec="http://schemas.microsoft.com/office/drawing/2017/decorative" val="1"/>
               </a:ext>
             </a:extLst>
           </p:cNvPr>
@@ -7088,28 +7039,28 @@
           <a:lstStyle/>
           <a:p>
             <a:r>
-              <a:rPr lang="pt-PT" sz="1600" b="1" dirty="0" err="1" smtClean="0"/>
+              <a:rPr lang="pt-PT" sz="1600" b="1" dirty="0" err="1"/>
               <a:t>Genetic</a:t>
             </a:r>
             <a:r>
-              <a:rPr lang="pt-PT" sz="1600" b="1" dirty="0" smtClean="0"/>
+              <a:rPr lang="pt-PT" sz="1600" b="1" dirty="0"/>
               <a:t> </a:t>
             </a:r>
             <a:r>
-              <a:rPr lang="pt-PT" sz="1600" b="1" dirty="0" err="1" smtClean="0"/>
+              <a:rPr lang="pt-PT" sz="1600" b="1" dirty="0" err="1"/>
               <a:t>Algorithms</a:t>
             </a:r>
             <a:r>
-              <a:rPr lang="pt-PT" sz="1600" b="1" dirty="0" smtClean="0"/>
+              <a:rPr lang="pt-PT" sz="1600" b="1" dirty="0"/>
               <a:t> </a:t>
             </a:r>
             <a:r>
-              <a:rPr lang="pt-PT" sz="1600" dirty="0" smtClean="0"/>
+              <a:rPr lang="pt-PT" sz="1600" dirty="0"/>
               <a:t>(GA)</a:t>
             </a:r>
           </a:p>
           <a:p>
-            <a:endParaRPr lang="pt-PT" sz="1600" b="1" dirty="0" smtClean="0"/>
+            <a:endParaRPr lang="pt-PT" sz="1600" b="1" dirty="0"/>
           </a:p>
           <a:p>
             <a:pPr algn="just">
@@ -7121,74 +7072,9 @@
               </a:spcAft>
             </a:pPr>
             <a:r>
-              <a:rPr lang="pt-PT" sz="1600" dirty="0" smtClean="0"/>
-              <a:t>A</a:t>
-            </a:r>
-            <a:r>
               <a:rPr lang="pt-PT" sz="1600" dirty="0"/>
-              <a:t> evolução </a:t>
-            </a:r>
-            <a:r>
-              <a:rPr lang="pt-PT" sz="1600" dirty="0" smtClean="0"/>
-              <a:t>inicia-se a partir </a:t>
-            </a:r>
-            <a:r>
-              <a:rPr lang="pt-PT" sz="1600" dirty="0"/>
-              <a:t>de um conjunto de soluções </a:t>
-            </a:r>
-            <a:r>
-              <a:rPr lang="pt-PT" sz="1600" dirty="0" smtClean="0"/>
-              <a:t>gerado </a:t>
-            </a:r>
-            <a:r>
-              <a:rPr lang="pt-PT" sz="1600" dirty="0"/>
-              <a:t>aleatoriamente </a:t>
-            </a:r>
-            <a:r>
-              <a:rPr lang="pt-PT" sz="1600" dirty="0" smtClean="0"/>
-              <a:t>(população) e </a:t>
-            </a:r>
-            <a:r>
-              <a:rPr lang="pt-PT" sz="1600" dirty="0"/>
-              <a:t>é realizada </a:t>
-            </a:r>
-            <a:r>
-              <a:rPr lang="pt-PT" sz="1600" dirty="0" smtClean="0"/>
-              <a:t>através de gerações</a:t>
-            </a:r>
-            <a:r>
-              <a:rPr lang="pt-PT" sz="1600" dirty="0"/>
-              <a:t>. A cada geração, a adaptação </a:t>
-            </a:r>
-            <a:r>
-              <a:rPr lang="pt-PT" sz="1600" dirty="0" smtClean="0"/>
-              <a:t>de cada solução </a:t>
-            </a:r>
-            <a:r>
-              <a:rPr lang="pt-PT" sz="1600" dirty="0"/>
-              <a:t>na população é avaliada, alguns indivíduos são selecionados para a próxima geração, e </a:t>
-            </a:r>
-            <a:r>
-              <a:rPr lang="pt-PT" sz="1600" dirty="0" smtClean="0"/>
-              <a:t>recombinados/mutados</a:t>
-            </a:r>
-            <a:r>
-              <a:rPr lang="pt-PT" sz="1600" dirty="0"/>
-              <a:t> </a:t>
-            </a:r>
-            <a:r>
-              <a:rPr lang="pt-PT" sz="1600" dirty="0" smtClean="0"/>
-              <a:t>formando uma nova população que </a:t>
-            </a:r>
-            <a:r>
-              <a:rPr lang="pt-PT" sz="1600" dirty="0"/>
-              <a:t>é utilizada como entrada para a próxima iteração do algoritmo</a:t>
-            </a:r>
-            <a:r>
-              <a:rPr lang="pt-PT" sz="1600" dirty="0" smtClean="0"/>
-              <a:t>.</a:t>
-            </a:r>
-            <a:endParaRPr lang="pt-PT" sz="1600" dirty="0"/>
+              <a:t>A evolução inicia-se a partir de um conjunto de soluções gerado aleatoriamente (população) e é realizada através de gerações. A cada geração, a adaptação de cada solução na população é avaliada, alguns indivíduos são selecionados para a próxima geração, e recombinados/mutados formando uma nova população que é utilizada como entrada para a próxima iteração do algoritmo.</a:t>
+            </a:r>
           </a:p>
         </p:txBody>
       </p:sp>
@@ -7222,21 +7108,21 @@
           <a:p>
             <a:pPr algn="just"/>
             <a:r>
-              <a:rPr lang="pt-PT" sz="1600" b="1" dirty="0" smtClean="0"/>
+              <a:rPr lang="pt-PT" sz="1600" b="1" dirty="0"/>
               <a:t>Local </a:t>
             </a:r>
             <a:r>
-              <a:rPr lang="pt-PT" sz="1600" b="1" dirty="0" err="1" smtClean="0"/>
+              <a:rPr lang="pt-PT" sz="1600" b="1" dirty="0" err="1"/>
               <a:t>Search</a:t>
             </a:r>
             <a:r>
-              <a:rPr lang="pt-PT" sz="1600" dirty="0" smtClean="0"/>
+              <a:rPr lang="pt-PT" sz="1600" dirty="0"/>
               <a:t> (LS)</a:t>
             </a:r>
           </a:p>
           <a:p>
             <a:pPr algn="just"/>
-            <a:endParaRPr lang="pt-PT" sz="1600" b="1" dirty="0" smtClean="0"/>
+            <a:endParaRPr lang="pt-PT" sz="1600" b="1" dirty="0"/>
           </a:p>
           <a:p>
             <a:pPr algn="just">
@@ -7245,24 +7131,8 @@
               </a:lnSpc>
             </a:pPr>
             <a:r>
-              <a:rPr lang="pt-PT" sz="1600" dirty="0" smtClean="0"/>
-              <a:t>Explora </a:t>
-            </a:r>
-            <a:r>
               <a:rPr lang="pt-PT" sz="1600" dirty="0"/>
-              <a:t>o espaço de pesquisa </a:t>
-            </a:r>
-            <a:r>
-              <a:rPr lang="pt-PT" sz="1600" dirty="0" smtClean="0"/>
-              <a:t>modificando, de forma iterativa, </a:t>
-            </a:r>
-            <a:r>
-              <a:rPr lang="pt-PT" sz="1600" dirty="0"/>
-              <a:t>uma </a:t>
-            </a:r>
-            <a:r>
-              <a:rPr lang="pt-PT" sz="1600" dirty="0" smtClean="0"/>
-              <a:t>combinação: partindo de uma combinação inicial, o algoritmo passa da combinação atual para uma vizinha, através da aplicação de transformações. </a:t>
+              <a:t>Explora o espaço de pesquisa modificando, de forma iterativa, uma combinação: partindo de uma combinação inicial, o algoritmo passa da combinação atual para uma vizinha, através da aplicação de transformações. </a:t>
             </a:r>
           </a:p>
           <a:p>
@@ -7272,24 +7142,8 @@
               </a:lnSpc>
             </a:pPr>
             <a:r>
-              <a:rPr lang="pt-PT" sz="1600" dirty="0" smtClean="0"/>
-              <a:t>LS </a:t>
-            </a:r>
-            <a:r>
               <a:rPr lang="pt-PT" sz="1600" dirty="0"/>
-              <a:t>pode ser visto como um caso muito particular </a:t>
-            </a:r>
-            <a:r>
-              <a:rPr lang="pt-PT" sz="1600" dirty="0" smtClean="0"/>
-              <a:t>de GA cuja população </a:t>
-            </a:r>
-            <a:r>
-              <a:rPr lang="pt-PT" sz="1600" dirty="0"/>
-              <a:t>é composta por apenas uma </a:t>
-            </a:r>
-            <a:r>
-              <a:rPr lang="pt-PT" sz="1600" dirty="0" smtClean="0"/>
-              <a:t>combinação.</a:t>
+              <a:t>LS pode ser visto como um caso muito particular de GA cuja população é composta por apenas uma combinação.</a:t>
             </a:r>
           </a:p>
           <a:p>
@@ -7299,28 +7153,24 @@
               </a:lnSpc>
             </a:pPr>
             <a:r>
-              <a:rPr lang="pt-PT" sz="1600" dirty="0" smtClean="0"/>
+              <a:rPr lang="pt-PT" sz="1600" dirty="0"/>
               <a:t>Destacam-se os algoritmos: </a:t>
             </a:r>
             <a:r>
-              <a:rPr lang="pt-PT" sz="1600" dirty="0" smtClean="0">
+              <a:rPr lang="pt-PT" sz="1600" dirty="0">
                 <a:hlinkClick r:id="rId2" tooltip="Hill climbing"/>
               </a:rPr>
               <a:t>Hill </a:t>
             </a:r>
             <a:r>
-              <a:rPr lang="pt-PT" sz="1600" dirty="0" err="1" smtClean="0">
+              <a:rPr lang="pt-PT" sz="1600" dirty="0" err="1">
                 <a:hlinkClick r:id="rId2" tooltip="Hill climbing"/>
               </a:rPr>
               <a:t>climbing</a:t>
             </a:r>
             <a:r>
               <a:rPr lang="pt-PT" sz="1600" dirty="0"/>
-              <a:t> </a:t>
-            </a:r>
-            <a:r>
-              <a:rPr lang="pt-PT" sz="1600" dirty="0" smtClean="0"/>
-              <a:t>e </a:t>
+              <a:t> e </a:t>
             </a:r>
             <a:r>
               <a:rPr lang="pt-PT" sz="1600" dirty="0" err="1">
@@ -7335,7 +7185,7 @@
               <a:t> </a:t>
             </a:r>
             <a:r>
-              <a:rPr lang="pt-PT" sz="1600" dirty="0" err="1" smtClean="0">
+              <a:rPr lang="pt-PT" sz="1600" dirty="0" err="1">
                 <a:hlinkClick r:id="rId3" tooltip="Simulated annealing"/>
               </a:rPr>
               <a:t>annealing</a:t>
@@ -7344,7 +7194,7 @@
               <a:rPr lang="pt-PT" sz="1600" dirty="0"/>
               <a:t>.</a:t>
             </a:r>
-            <a:endParaRPr lang="pt-PT" sz="1400" dirty="0" smtClean="0"/>
+            <a:endParaRPr lang="pt-PT" sz="1400" dirty="0"/>
           </a:p>
         </p:txBody>
       </p:sp>
@@ -7394,7 +7244,7 @@
                 <a16:creationId xmlns:a16="http://schemas.microsoft.com/office/drawing/2014/main" id="{D6D7A0BC-0046-4CAA-8E7F-DCAFE511EA0E}"/>
               </a:ext>
               <a:ext uri="{C183D7F6-B498-43B3-948B-1728B52AA6E4}">
-                <adec:decorative xmlns="" xmlns:adec="http://schemas.microsoft.com/office/drawing/2017/decorative" val="1"/>
+                <adec:decorative xmlns:adec="http://schemas.microsoft.com/office/drawing/2017/decorative" val="1"/>
               </a:ext>
             </a:extLst>
           </p:cNvPr>
@@ -7529,7 +7379,7 @@
           <a:p>
             <a:pPr rtl="0"/>
             <a:r>
-              <a:rPr lang="pt-PT" sz="2000" b="1" cap="none" dirty="0" smtClean="0">
+              <a:rPr lang="pt-PT" sz="2000" b="1" cap="none" dirty="0">
                 <a:ln w="0"/>
                 <a:effectLst>
                   <a:outerShdw blurRad="38100" dist="25400" dir="5400000" algn="ctr" rotWithShape="0">
@@ -7553,7 +7403,7 @@
                 <a16:creationId xmlns:a16="http://schemas.microsoft.com/office/drawing/2014/main" id="{E7C6334F-6411-41EC-AD7D-179EDD8B58CB}"/>
               </a:ext>
               <a:ext uri="{C183D7F6-B498-43B3-948B-1728B52AA6E4}">
-                <adec:decorative xmlns="" xmlns:adec="http://schemas.microsoft.com/office/drawing/2017/decorative" val="1"/>
+                <adec:decorative xmlns:adec="http://schemas.microsoft.com/office/drawing/2017/decorative" val="1"/>
               </a:ext>
             </a:extLst>
           </p:cNvPr>
@@ -7607,7 +7457,7 @@
                 <a16:creationId xmlns:a16="http://schemas.microsoft.com/office/drawing/2014/main" id="{E6B02CEE-3AF8-4349-9B3E-8970E6DF62B3}"/>
               </a:ext>
               <a:ext uri="{C183D7F6-B498-43B3-948B-1728B52AA6E4}">
-                <adec:decorative xmlns="" xmlns:adec="http://schemas.microsoft.com/office/drawing/2017/decorative" val="1"/>
+                <adec:decorative xmlns:adec="http://schemas.microsoft.com/office/drawing/2017/decorative" val="1"/>
               </a:ext>
             </a:extLst>
           </p:cNvPr>
@@ -7661,7 +7511,7 @@
                 <a16:creationId xmlns:a16="http://schemas.microsoft.com/office/drawing/2014/main" id="{AAA01CF0-3FB5-44EB-B7DE-F2E86374C2FB}"/>
               </a:ext>
               <a:ext uri="{C183D7F6-B498-43B3-948B-1728B52AA6E4}">
-                <adec:decorative xmlns="" xmlns:adec="http://schemas.microsoft.com/office/drawing/2017/decorative" val="1"/>
+                <adec:decorative xmlns:adec="http://schemas.microsoft.com/office/drawing/2017/decorative" val="1"/>
               </a:ext>
             </a:extLst>
           </p:cNvPr>
@@ -7737,45 +7587,37 @@
           <a:p>
             <a:pPr algn="just"/>
             <a:r>
-              <a:rPr lang="pt-PT" sz="1600" dirty="0" smtClean="0"/>
+              <a:rPr lang="pt-PT" sz="1600" dirty="0"/>
               <a:t>O problema em questão é um problema da ronda de classificação do Google </a:t>
             </a:r>
             <a:r>
-              <a:rPr lang="pt-PT" sz="1600" dirty="0" err="1" smtClean="0"/>
+              <a:rPr lang="pt-PT" sz="1600" dirty="0" err="1"/>
               <a:t>Hash</a:t>
-            </a:r>
-            <a:r>
-              <a:rPr lang="pt-PT" sz="1600" dirty="0" smtClean="0"/>
-              <a:t> </a:t>
-            </a:r>
-            <a:r>
-              <a:rPr lang="pt-PT" sz="1600" dirty="0" err="1" smtClean="0"/>
-              <a:t>Code</a:t>
-            </a:r>
-            <a:r>
-              <a:rPr lang="pt-PT" sz="1600" dirty="0" smtClean="0"/>
-              <a:t> 2019 e como tal existem várias soluções </a:t>
-            </a:r>
-            <a:r>
-              <a:rPr lang="pt-PT" sz="1600" i="1" dirty="0" smtClean="0"/>
-              <a:t>online </a:t>
-            </a:r>
-            <a:r>
-              <a:rPr lang="pt-PT" sz="1600" dirty="0" smtClean="0"/>
-              <a:t>disponíveis.</a:t>
             </a:r>
             <a:r>
               <a:rPr lang="pt-PT" sz="1600" dirty="0"/>
               <a:t> </a:t>
             </a:r>
             <a:r>
-              <a:rPr lang="pt-PT" sz="1600" dirty="0" smtClean="0"/>
-              <a:t>Destacam-se:</a:t>
+              <a:rPr lang="pt-PT" sz="1600" dirty="0" err="1"/>
+              <a:t>Code</a:t>
+            </a:r>
+            <a:r>
+              <a:rPr lang="pt-PT" sz="1600" dirty="0"/>
+              <a:t> 2019 e como tal existem várias soluções </a:t>
+            </a:r>
+            <a:r>
+              <a:rPr lang="pt-PT" sz="1600" i="1" dirty="0"/>
+              <a:t>online </a:t>
+            </a:r>
+            <a:r>
+              <a:rPr lang="pt-PT" sz="1600" dirty="0"/>
+              <a:t>disponíveis. Destacam-se:</a:t>
             </a:r>
           </a:p>
           <a:p>
             <a:pPr algn="just"/>
-            <a:endParaRPr lang="pt-PT" sz="1600" dirty="0" smtClean="0"/>
+            <a:endParaRPr lang="pt-PT" sz="1600" dirty="0"/>
           </a:p>
           <a:p>
             <a:pPr marL="285750" indent="-285750" algn="just">
@@ -7783,16 +7625,10 @@
               <a:buChar char="•"/>
             </a:pPr>
             <a:r>
-              <a:rPr lang="en-US" sz="1600" dirty="0" smtClean="0">
-                <a:hlinkClick r:id="rId2"/>
-              </a:rPr>
-              <a:t>“How </a:t>
-            </a:r>
-            <a:r>
               <a:rPr lang="en-US" sz="1600" dirty="0">
                 <a:hlinkClick r:id="rId2"/>
               </a:rPr>
-              <a:t>we placed 1st in Italy and 22nd in the world @ Google </a:t>
+              <a:t>“How we placed 1st in Italy and 22nd in the world @ Google </a:t>
             </a:r>
             <a:r>
               <a:rPr lang="en-US" sz="1600" dirty="0" err="1">
@@ -7804,13 +7640,7 @@
               <a:rPr lang="en-US" sz="1600" dirty="0">
                 <a:hlinkClick r:id="rId2"/>
               </a:rPr>
-              <a:t> </a:t>
-            </a:r>
-            <a:r>
-              <a:rPr lang="en-US" sz="1600" dirty="0" smtClean="0">
-                <a:hlinkClick r:id="rId2"/>
-              </a:rPr>
-              <a:t>2019” </a:t>
+              <a:t> 2019” </a:t>
             </a:r>
             <a:endParaRPr lang="en-US" sz="1600" dirty="0"/>
           </a:p>
@@ -7820,24 +7650,24 @@
               <a:buChar char="•"/>
             </a:pPr>
             <a:r>
-              <a:rPr lang="en-US" sz="1600" dirty="0" smtClean="0">
+              <a:rPr lang="en-US" sz="1600" dirty="0">
                 <a:hlinkClick r:id="rId3"/>
               </a:rPr>
               <a:t>Github: </a:t>
             </a:r>
             <a:r>
-              <a:rPr lang="pt-PT" dirty="0" smtClean="0">
+              <a:rPr lang="pt-PT" dirty="0">
                 <a:hlinkClick r:id="rId3"/>
               </a:rPr>
               <a:t>chameleonTK/</a:t>
             </a:r>
             <a:r>
-              <a:rPr lang="pt-PT" b="1" dirty="0" smtClean="0">
+              <a:rPr lang="pt-PT" b="1" dirty="0">
                 <a:hlinkClick r:id="rId3"/>
               </a:rPr>
               <a:t>hashcode-2019 </a:t>
             </a:r>
-            <a:endParaRPr lang="pt-PT" b="1" dirty="0" smtClean="0"/>
+            <a:endParaRPr lang="pt-PT" b="1" dirty="0"/>
           </a:p>
           <a:p>
             <a:pPr marL="285750" indent="-285750" algn="just">
@@ -7850,7 +7680,7 @@
               </a:rPr>
               <a:t>Sean O'Mahoney - Blog</a:t>
             </a:r>
-            <a:endParaRPr lang="pt-PT" sz="1600" b="1" dirty="0" smtClean="0"/>
+            <a:endParaRPr lang="pt-PT" sz="1600" b="1" dirty="0"/>
           </a:p>
           <a:p>
             <a:pPr marL="285750" indent="-285750" algn="just">
@@ -7864,7 +7694,7 @@
               <a:buFont typeface="Arial" panose="020B0604020202020204" pitchFamily="34" charset="0"/>
               <a:buChar char="•"/>
             </a:pPr>
-            <a:endParaRPr lang="en-US" sz="1600" dirty="0" smtClean="0"/>
+            <a:endParaRPr lang="en-US" sz="1600" dirty="0"/>
           </a:p>
           <a:p>
             <a:pPr algn="just"/>
@@ -7906,7 +7736,7 @@
               </a:lnSpc>
             </a:pPr>
             <a:r>
-              <a:rPr lang="pt-PT" sz="1600" dirty="0" smtClean="0"/>
+              <a:rPr lang="pt-PT" sz="1600" dirty="0"/>
               <a:t>Relativamente aos algoritmos a utilizar destacam-se as seguintes fontes:</a:t>
             </a:r>
           </a:p>
@@ -7919,19 +7749,19 @@
               <a:buChar char="•"/>
             </a:pPr>
             <a:r>
-              <a:rPr lang="pt-PT" sz="1600" dirty="0" smtClean="0">
+              <a:rPr lang="pt-PT" sz="1600" dirty="0">
                 <a:hlinkClick r:id="rId5"/>
               </a:rPr>
               <a:t>Artificial </a:t>
             </a:r>
             <a:r>
-              <a:rPr lang="pt-PT" sz="1600" dirty="0" err="1" smtClean="0">
+              <a:rPr lang="pt-PT" sz="1600" dirty="0" err="1">
                 <a:hlinkClick r:id="rId5"/>
               </a:rPr>
               <a:t>Intelligent</a:t>
             </a:r>
             <a:r>
-              <a:rPr lang="pt-PT" sz="1600" dirty="0" smtClean="0">
+              <a:rPr lang="pt-PT" sz="1600" dirty="0">
                 <a:hlinkClick r:id="rId5"/>
               </a:rPr>
               <a:t>: A </a:t>
@@ -7940,22 +7770,16 @@
               <a:rPr lang="pt-PT" sz="1600" dirty="0" err="1">
                 <a:hlinkClick r:id="rId5"/>
               </a:rPr>
-              <a:t>M</a:t>
-            </a:r>
-            <a:r>
-              <a:rPr lang="pt-PT" sz="1600" dirty="0" err="1" smtClean="0">
-                <a:hlinkClick r:id="rId5"/>
-              </a:rPr>
-              <a:t>odern</a:t>
-            </a:r>
-            <a:r>
-              <a:rPr lang="pt-PT" sz="1600" dirty="0" smtClean="0">
+              <a:t>Modern</a:t>
+            </a:r>
+            <a:r>
+              <a:rPr lang="pt-PT" sz="1600" dirty="0">
                 <a:hlinkClick r:id="rId5"/>
               </a:rPr>
               <a:t> </a:t>
             </a:r>
             <a:r>
-              <a:rPr lang="pt-PT" sz="1600" dirty="0" err="1" smtClean="0">
+              <a:rPr lang="pt-PT" sz="1600" dirty="0" err="1">
                 <a:hlinkClick r:id="rId5"/>
               </a:rPr>
               <a:t>Approach</a:t>
@@ -7977,7 +7801,7 @@
               <a:t>Norvig</a:t>
             </a:r>
             <a:r>
-              <a:rPr lang="pt-PT" sz="1600" dirty="0" smtClean="0"/>
+              <a:rPr lang="pt-PT" sz="1600" dirty="0"/>
               <a:t>)</a:t>
             </a:r>
           </a:p>
@@ -7990,12 +7814,12 @@
               <a:buChar char="•"/>
             </a:pPr>
             <a:r>
-              <a:rPr lang="pt-PT" sz="1600" dirty="0" smtClean="0">
+              <a:rPr lang="pt-PT" sz="1600" dirty="0">
                 <a:hlinkClick r:id="rId6"/>
               </a:rPr>
               <a:t>Wikipédia: Algoritmo Genético </a:t>
             </a:r>
-            <a:endParaRPr lang="pt-PT" sz="1600" dirty="0" smtClean="0"/>
+            <a:endParaRPr lang="pt-PT" sz="1600" dirty="0"/>
           </a:p>
           <a:p>
             <a:pPr marL="285750" indent="-285750" algn="just">
@@ -8006,18 +7830,18 @@
               <a:buChar char="•"/>
             </a:pPr>
             <a:r>
-              <a:rPr lang="pt-PT" sz="1600" dirty="0" smtClean="0">
+              <a:rPr lang="pt-PT" sz="1600" dirty="0">
                 <a:hlinkClick r:id="rId7"/>
               </a:rPr>
               <a:t>Wikipédia: Local </a:t>
             </a:r>
             <a:r>
-              <a:rPr lang="pt-PT" sz="1600" dirty="0" err="1" smtClean="0">
+              <a:rPr lang="pt-PT" sz="1600" dirty="0" err="1">
                 <a:hlinkClick r:id="rId7"/>
               </a:rPr>
               <a:t>Search</a:t>
             </a:r>
-            <a:endParaRPr lang="pt-PT" sz="1600" dirty="0" smtClean="0"/>
+            <a:endParaRPr lang="pt-PT" sz="1600" dirty="0"/>
           </a:p>
           <a:p>
             <a:pPr marL="285750" indent="-285750" algn="just">
@@ -8070,15 +7894,15 @@
               <a:t> </a:t>
             </a:r>
             <a:r>
-              <a:rPr lang="pt-PT" sz="1600" dirty="0" smtClean="0"/>
+              <a:rPr lang="pt-PT" sz="1600" dirty="0"/>
               <a:t>(</a:t>
             </a:r>
             <a:r>
-              <a:rPr lang="pt-PT" sz="1600" dirty="0" err="1" smtClean="0"/>
+              <a:rPr lang="pt-PT" sz="1600" dirty="0" err="1"/>
               <a:t>Jin-Kao</a:t>
             </a:r>
             <a:r>
-              <a:rPr lang="pt-PT" sz="1600" dirty="0" smtClean="0"/>
+              <a:rPr lang="pt-PT" sz="1600" dirty="0"/>
               <a:t> </a:t>
             </a:r>
             <a:r>
@@ -8090,17 +7914,17 @@
               <a:t>, Christine </a:t>
             </a:r>
             <a:r>
-              <a:rPr lang="pt-PT" sz="1600" dirty="0" err="1" smtClean="0"/>
+              <a:rPr lang="pt-PT" sz="1600" dirty="0" err="1"/>
               <a:t>Solnon</a:t>
             </a:r>
             <a:r>
-              <a:rPr lang="pt-PT" sz="1600" dirty="0" smtClean="0"/>
+              <a:rPr lang="pt-PT" sz="1600" dirty="0"/>
               <a:t>)</a:t>
             </a:r>
           </a:p>
           <a:p>
             <a:pPr algn="just"/>
-            <a:endParaRPr lang="pt-PT" sz="1600" dirty="0" smtClean="0"/>
+            <a:endParaRPr lang="pt-PT" sz="1600" dirty="0"/>
           </a:p>
         </p:txBody>
       </p:sp>

</xml_diff>